<commit_message>
bx bài tập phân lớp
</commit_message>
<xml_diff>
--- a/Bai 15 Phan lop van ban_p2.pptx
+++ b/Bai 15 Phan lop van ban_p2.pptx
@@ -5,7 +5,7 @@
     <p:sldMasterId id="2147483652" r:id="rId1"/>
   </p:sldMasterIdLst>
   <p:notesMasterIdLst>
-    <p:notesMasterId r:id="rId24"/>
+    <p:notesMasterId r:id="rId25"/>
   </p:notesMasterIdLst>
   <p:sldIdLst>
     <p:sldId id="555" r:id="rId2"/>
@@ -29,7 +29,8 @@
     <p:sldId id="558" r:id="rId20"/>
     <p:sldId id="560" r:id="rId21"/>
     <p:sldId id="561" r:id="rId22"/>
-    <p:sldId id="418" r:id="rId23"/>
+    <p:sldId id="562" r:id="rId23"/>
+    <p:sldId id="418" r:id="rId24"/>
   </p:sldIdLst>
   <p:sldSz cx="9144000" cy="6858000" type="screen4x3"/>
   <p:notesSz cx="6858000" cy="9144000"/>
@@ -160,7 +161,7 @@
   </p:defaultTextStyle>
   <p:extLst>
     <p:ext uri="{EFAFB233-063F-42B5-8137-9DF3F51BA10A}">
-      <p15:sldGuideLst xmlns="" xmlns:p15="http://schemas.microsoft.com/office/powerpoint/2012/main">
+      <p15:sldGuideLst xmlns:p15="http://schemas.microsoft.com/office/powerpoint/2012/main" xmlns="">
         <p15:guide id="1" orient="horz" pos="2160">
           <p15:clr>
             <a:srgbClr val="A4A3A4"/>
@@ -10311,11 +10312,7 @@
             </a:r>
             <a:r>
               <a:rPr lang="en-US" sz="3600" smtClean="0"/>
-              <a:t> tập </a:t>
-            </a:r>
-            <a:r>
-              <a:rPr lang="en-US" sz="3600" smtClean="0"/>
-              <a:t>15.3</a:t>
+              <a:t> tập 15.3</a:t>
             </a:r>
             <a:endParaRPr lang="vi-VN" sz="3600" dirty="0" smtClean="0"/>
           </a:p>
@@ -10749,11 +10746,7 @@
             </a:r>
             <a:r>
               <a:rPr lang="en-US" sz="3600" smtClean="0"/>
-              <a:t> tập </a:t>
-            </a:r>
-            <a:r>
-              <a:rPr lang="en-US" sz="3600" smtClean="0"/>
-              <a:t>15.4</a:t>
+              <a:t> tập 15.4</a:t>
             </a:r>
             <a:endParaRPr lang="vi-VN" sz="3600" dirty="0" smtClean="0"/>
           </a:p>
@@ -10933,6 +10926,200 @@
       </p:grpSpPr>
       <p:sp>
         <p:nvSpPr>
+          <p:cNvPr id="6146" name="Rectangle 2"/>
+          <p:cNvSpPr>
+            <a:spLocks noGrp="1" noChangeArrowheads="1"/>
+          </p:cNvSpPr>
+          <p:nvPr>
+            <p:ph type="title"/>
+          </p:nvPr>
+        </p:nvSpPr>
+        <p:spPr/>
+        <p:txBody>
+          <a:bodyPr/>
+          <a:lstStyle/>
+          <a:p>
+            <a:pPr eaLnBrk="1" hangingPunct="1"/>
+            <a:r>
+              <a:rPr lang="en-US" sz="3600" err="1" smtClean="0"/>
+              <a:t>Bài</a:t>
+            </a:r>
+            <a:r>
+              <a:rPr lang="en-US" sz="3600" smtClean="0"/>
+              <a:t> tập </a:t>
+            </a:r>
+            <a:r>
+              <a:rPr lang="en-US" sz="3600" smtClean="0"/>
+              <a:t>15.5</a:t>
+            </a:r>
+            <a:endParaRPr lang="vi-VN" sz="3600" dirty="0" smtClean="0"/>
+          </a:p>
+        </p:txBody>
+      </p:sp>
+      <p:sp>
+        <p:nvSpPr>
+          <p:cNvPr id="6147" name="Rectangle 3"/>
+          <p:cNvSpPr>
+            <a:spLocks noGrp="1" noChangeArrowheads="1"/>
+          </p:cNvSpPr>
+          <p:nvPr>
+            <p:ph type="body" idx="1"/>
+          </p:nvPr>
+        </p:nvSpPr>
+        <p:spPr>
+          <a:xfrm>
+            <a:off x="683568" y="4005064"/>
+            <a:ext cx="8271520" cy="2160240"/>
+          </a:xfrm>
+        </p:spPr>
+        <p:txBody>
+          <a:bodyPr/>
+          <a:lstStyle/>
+          <a:p>
+            <a:pPr marL="0" indent="0" algn="just" eaLnBrk="1" hangingPunct="1">
+              <a:buNone/>
+              <a:defRPr/>
+            </a:pPr>
+            <a:r>
+              <a:rPr lang="en-US" sz="2400" smtClean="0"/>
+              <a:t>Trên cơ sở bộ dữ liệu đã cho hãy (i) thiết lập bộ phân lớp Naïve Bayes đã thức (ii) Áp dụng phân lớp văn bản kiểm thử (iii) thiết lập bộ phân lớp Bernoulli (iv) Áp dụng phân lớp văn bản kiểm thử.</a:t>
+            </a:r>
+          </a:p>
+          <a:p>
+            <a:pPr marL="0" indent="0" algn="just" eaLnBrk="1" hangingPunct="1">
+              <a:buNone/>
+              <a:defRPr/>
+            </a:pPr>
+            <a:r>
+              <a:rPr lang="en-US" sz="2400" smtClean="0"/>
+              <a:t>Không cần xác định những tham số không dùng đến trong phân lớp.</a:t>
+            </a:r>
+            <a:endParaRPr lang="en-US" sz="2400" dirty="0" smtClean="0"/>
+          </a:p>
+        </p:txBody>
+      </p:sp>
+      <p:sp>
+        <p:nvSpPr>
+          <p:cNvPr id="2" name="Slide Number Placeholder 1"/>
+          <p:cNvSpPr>
+            <a:spLocks noGrp="1"/>
+          </p:cNvSpPr>
+          <p:nvPr>
+            <p:ph type="sldNum" sz="quarter" idx="12"/>
+          </p:nvPr>
+        </p:nvSpPr>
+        <p:spPr/>
+        <p:txBody>
+          <a:bodyPr/>
+          <a:lstStyle/>
+          <a:p>
+            <a:pPr>
+              <a:defRPr/>
+            </a:pPr>
+            <a:fld id="{A81E07A1-38DA-436E-9EB2-1E501CB9FFA7}" type="slidenum">
+              <a:rPr lang="vi-VN" smtClean="0"/>
+              <a:pPr>
+                <a:defRPr/>
+              </a:pPr>
+              <a:t>22</a:t>
+            </a:fld>
+            <a:endParaRPr lang="vi-VN"/>
+          </a:p>
+        </p:txBody>
+      </p:sp>
+      <p:pic>
+        <p:nvPicPr>
+          <p:cNvPr id="1026" name="Picture 2"/>
+          <p:cNvPicPr>
+            <a:picLocks noChangeAspect="1" noChangeArrowheads="1"/>
+          </p:cNvPicPr>
+          <p:nvPr/>
+        </p:nvPicPr>
+        <p:blipFill>
+          <a:blip r:embed="rId2">
+            <a:extLst>
+              <a:ext uri="{28A0092B-C50C-407E-A947-70E740481C1C}">
+                <a14:useLocalDpi xmlns:a14="http://schemas.microsoft.com/office/drawing/2010/main" val="0"/>
+              </a:ext>
+            </a:extLst>
+          </a:blip>
+          <a:srcRect/>
+          <a:stretch>
+            <a:fillRect/>
+          </a:stretch>
+        </p:blipFill>
+        <p:spPr bwMode="auto">
+          <a:xfrm>
+            <a:off x="755576" y="2060848"/>
+            <a:ext cx="7248525" cy="1876425"/>
+          </a:xfrm>
+          <a:prstGeom prst="rect">
+            <a:avLst/>
+          </a:prstGeom>
+          <a:noFill/>
+          <a:ln>
+            <a:noFill/>
+          </a:ln>
+          <a:extLst>
+            <a:ext uri="{909E8E84-426E-40DD-AFC4-6F175D3DCCD1}">
+              <a14:hiddenFill xmlns:a14="http://schemas.microsoft.com/office/drawing/2010/main">
+                <a:solidFill>
+                  <a:schemeClr val="accent1"/>
+                </a:solidFill>
+              </a14:hiddenFill>
+            </a:ext>
+            <a:ext uri="{91240B29-F687-4F45-9708-019B960494DF}">
+              <a14:hiddenLine xmlns:a14="http://schemas.microsoft.com/office/drawing/2010/main" w="9525">
+                <a:solidFill>
+                  <a:schemeClr val="tx1"/>
+                </a:solidFill>
+                <a:miter lim="800000"/>
+                <a:headEnd/>
+                <a:tailEnd/>
+              </a14:hiddenLine>
+            </a:ext>
+          </a:extLst>
+        </p:spPr>
+      </p:pic>
+    </p:spTree>
+    <p:extLst>
+      <p:ext uri="{BB962C8B-B14F-4D97-AF65-F5344CB8AC3E}">
+        <p14:creationId xmlns:p14="http://schemas.microsoft.com/office/powerpoint/2010/main" val="3834574425"/>
+      </p:ext>
+    </p:extLst>
+  </p:cSld>
+  <p:clrMapOvr>
+    <a:masterClrMapping/>
+  </p:clrMapOvr>
+  <p:timing>
+    <p:tnLst>
+      <p:par>
+        <p:cTn id="1" dur="indefinite" restart="never" nodeType="tmRoot"/>
+      </p:par>
+    </p:tnLst>
+  </p:timing>
+</p:sld>
+</file>
+
+<file path=ppt/slides/slide23.xml><?xml version="1.0" encoding="utf-8"?>
+<p:sld xmlns:a="http://schemas.openxmlformats.org/drawingml/2006/main" xmlns:r="http://schemas.openxmlformats.org/officeDocument/2006/relationships" xmlns:p="http://schemas.openxmlformats.org/presentationml/2006/main">
+  <p:cSld>
+    <p:spTree>
+      <p:nvGrpSpPr>
+        <p:cNvPr id="1" name=""/>
+        <p:cNvGrpSpPr/>
+        <p:nvPr/>
+      </p:nvGrpSpPr>
+      <p:grpSpPr>
+        <a:xfrm>
+          <a:off x="0" y="0"/>
+          <a:ext cx="0" cy="0"/>
+          <a:chOff x="0" y="0"/>
+          <a:chExt cx="0" cy="0"/>
+        </a:xfrm>
+      </p:grpSpPr>
+      <p:sp>
+        <p:nvSpPr>
           <p:cNvPr id="18434" name="Rectangle 2"/>
           <p:cNvSpPr>
             <a:spLocks noGrp="1" noChangeArrowheads="1"/>
@@ -11028,7 +11215,7 @@
               <a:pPr>
                 <a:defRPr/>
               </a:pPr>
-              <a:t>22</a:t>
+              <a:t>23</a:t>
             </a:fld>
             <a:endParaRPr lang="vi-VN"/>
           </a:p>
@@ -14160,7 +14347,7 @@
   </a:extraClrSchemeLst>
   <a:extLst>
     <a:ext uri="{05A4C25C-085E-4340-85A3-A5531E510DB2}">
-      <thm15:themeFamily xmlns="" xmlns:thm15="http://schemas.microsoft.com/office/thememl/2012/main" name="Office Theme" id="{62F939B6-93AF-4DB8-9C6B-D6C7DFDC589F}" vid="{4A3C46E8-61CC-4603-A589-7422A47A8E4A}"/>
+      <thm15:themeFamily xmlns:thm15="http://schemas.microsoft.com/office/thememl/2012/main" xmlns="" name="Office Theme" id="{62F939B6-93AF-4DB8-9C6B-D6C7DFDC589F}" vid="{4A3C46E8-61CC-4603-A589-7422A47A8E4A}"/>
     </a:ext>
   </a:extLst>
 </a:theme>
@@ -14421,7 +14608,7 @@
   <a:extraClrSchemeLst/>
   <a:extLst>
     <a:ext uri="{05A4C25C-085E-4340-85A3-A5531E510DB2}">
-      <thm15:themeFamily xmlns="" xmlns:thm15="http://schemas.microsoft.com/office/thememl/2012/main" name="Office Theme" id="{62F939B6-93AF-4DB8-9C6B-D6C7DFDC589F}" vid="{4A3C46E8-61CC-4603-A589-7422A47A8E4A}"/>
+      <thm15:themeFamily xmlns:thm15="http://schemas.microsoft.com/office/thememl/2012/main" xmlns="" name="Office Theme" id="{62F939B6-93AF-4DB8-9C6B-D6C7DFDC589F}" vid="{4A3C46E8-61CC-4603-A589-7422A47A8E4A}"/>
     </a:ext>
   </a:extLst>
 </a:theme>

</xml_diff>

<commit_message>
Sửa một vài lỗi trình bày
</commit_message>
<xml_diff>
--- a/Bai 15 Phan lop van ban_p2.pptx
+++ b/Bai 15 Phan lop van ban_p2.pptx
@@ -5,7 +5,7 @@
     <p:sldMasterId id="2147483652" r:id="rId1"/>
   </p:sldMasterIdLst>
   <p:notesMasterIdLst>
-    <p:notesMasterId r:id="rId25"/>
+    <p:notesMasterId r:id="rId26"/>
   </p:notesMasterIdLst>
   <p:sldIdLst>
     <p:sldId id="555" r:id="rId2"/>
@@ -14,23 +14,24 @@
     <p:sldId id="517" r:id="rId5"/>
     <p:sldId id="539" r:id="rId6"/>
     <p:sldId id="540" r:id="rId7"/>
-    <p:sldId id="550" r:id="rId8"/>
-    <p:sldId id="543" r:id="rId9"/>
-    <p:sldId id="542" r:id="rId10"/>
-    <p:sldId id="544" r:id="rId11"/>
-    <p:sldId id="553" r:id="rId12"/>
-    <p:sldId id="554" r:id="rId13"/>
-    <p:sldId id="546" r:id="rId14"/>
-    <p:sldId id="559" r:id="rId15"/>
-    <p:sldId id="556" r:id="rId16"/>
-    <p:sldId id="557" r:id="rId17"/>
-    <p:sldId id="536" r:id="rId18"/>
-    <p:sldId id="549" r:id="rId19"/>
-    <p:sldId id="558" r:id="rId20"/>
-    <p:sldId id="560" r:id="rId21"/>
-    <p:sldId id="561" r:id="rId22"/>
-    <p:sldId id="562" r:id="rId23"/>
-    <p:sldId id="418" r:id="rId24"/>
+    <p:sldId id="563" r:id="rId8"/>
+    <p:sldId id="550" r:id="rId9"/>
+    <p:sldId id="543" r:id="rId10"/>
+    <p:sldId id="542" r:id="rId11"/>
+    <p:sldId id="544" r:id="rId12"/>
+    <p:sldId id="553" r:id="rId13"/>
+    <p:sldId id="554" r:id="rId14"/>
+    <p:sldId id="546" r:id="rId15"/>
+    <p:sldId id="559" r:id="rId16"/>
+    <p:sldId id="556" r:id="rId17"/>
+    <p:sldId id="557" r:id="rId18"/>
+    <p:sldId id="536" r:id="rId19"/>
+    <p:sldId id="549" r:id="rId20"/>
+    <p:sldId id="558" r:id="rId21"/>
+    <p:sldId id="560" r:id="rId22"/>
+    <p:sldId id="561" r:id="rId23"/>
+    <p:sldId id="562" r:id="rId24"/>
+    <p:sldId id="418" r:id="rId25"/>
   </p:sldIdLst>
   <p:sldSz cx="9144000" cy="6858000" type="screen4x3"/>
   <p:notesSz cx="6858000" cy="9144000"/>
@@ -161,7 +162,7 @@
   </p:defaultTextStyle>
   <p:extLst>
     <p:ext uri="{EFAFB233-063F-42B5-8137-9DF3F51BA10A}">
-      <p15:sldGuideLst xmlns:p15="http://schemas.microsoft.com/office/powerpoint/2012/main" xmlns="">
+      <p15:sldGuideLst xmlns="" xmlns:p15="http://schemas.microsoft.com/office/powerpoint/2012/main">
         <p15:guide id="1" orient="horz" pos="2160">
           <p15:clr>
             <a:srgbClr val="A4A3A4"/>
@@ -957,7 +958,7 @@
               <a:pPr>
                 <a:defRPr/>
               </a:pPr>
-              <a:t>12</a:t>
+              <a:t>13</a:t>
             </a:fld>
             <a:endParaRPr lang="vi-VN"/>
           </a:p>
@@ -1023,7 +1024,7 @@
                 <a:ea typeface="ＭＳ Ｐゴシック" charset="-128"/>
               </a:rPr>
               <a:pPr/>
-              <a:t>17</a:t>
+              <a:t>18</a:t>
             </a:fld>
             <a:endParaRPr lang="en-US" smtClean="0">
               <a:ea typeface="ＭＳ Ｐゴシック" charset="-128"/>
@@ -7403,7 +7404,7 @@
             <a:pPr eaLnBrk="1" hangingPunct="1"/>
             <a:r>
               <a:rPr lang="en-US" sz="3600" dirty="0" err="1" smtClean="0"/>
-              <a:t>Giải</a:t>
+              <a:t>Trích</a:t>
             </a:r>
             <a:r>
               <a:rPr lang="en-US" sz="3600" dirty="0" smtClean="0"/>
@@ -7411,7 +7412,7 @@
             </a:r>
             <a:r>
               <a:rPr lang="en-US" sz="3600" dirty="0" err="1" smtClean="0"/>
-              <a:t>thuật</a:t>
+              <a:t>chọn</a:t>
             </a:r>
             <a:r>
               <a:rPr lang="en-US" sz="3600" dirty="0" smtClean="0"/>
@@ -7419,7 +7420,7 @@
             </a:r>
             <a:r>
               <a:rPr lang="en-US" sz="3600" dirty="0" err="1" smtClean="0"/>
-              <a:t>trích</a:t>
+              <a:t>đặc</a:t>
             </a:r>
             <a:r>
               <a:rPr lang="en-US" sz="3600" dirty="0" smtClean="0"/>
@@ -7427,25 +7428,57 @@
             </a:r>
             <a:r>
               <a:rPr lang="en-US" sz="3600" dirty="0" err="1" smtClean="0"/>
-              <a:t>chọn</a:t>
-            </a:r>
-            <a:r>
-              <a:rPr lang="en-US" sz="3600" dirty="0" smtClean="0"/>
-              <a:t> </a:t>
-            </a:r>
-            <a:r>
-              <a:rPr lang="en-US" sz="3600" dirty="0" err="1" smtClean="0"/>
-              <a:t>đặc</a:t>
-            </a:r>
-            <a:r>
-              <a:rPr lang="en-US" sz="3600" dirty="0" smtClean="0"/>
-              <a:t> </a:t>
-            </a:r>
-            <a:r>
-              <a:rPr lang="en-US" sz="3600" dirty="0" err="1" smtClean="0"/>
               <a:t>trưng</a:t>
             </a:r>
             <a:endParaRPr lang="vi-VN" sz="3600" dirty="0" smtClean="0"/>
+          </a:p>
+        </p:txBody>
+      </p:sp>
+      <p:sp>
+        <p:nvSpPr>
+          <p:cNvPr id="6147" name="Rectangle 3"/>
+          <p:cNvSpPr>
+            <a:spLocks noGrp="1" noChangeArrowheads="1"/>
+          </p:cNvSpPr>
+          <p:nvPr>
+            <p:ph type="body" idx="1"/>
+          </p:nvPr>
+        </p:nvSpPr>
+        <p:spPr>
+          <a:xfrm>
+            <a:off x="467544" y="2017712"/>
+            <a:ext cx="8487544" cy="4683125"/>
+          </a:xfrm>
+        </p:spPr>
+        <p:txBody>
+          <a:bodyPr/>
+          <a:lstStyle/>
+          <a:p>
+            <a:pPr algn="just" eaLnBrk="1" hangingPunct="1">
+              <a:defRPr/>
+            </a:pPr>
+            <a:r>
+              <a:rPr lang="en-US" sz="2800" smtClean="0"/>
+              <a:t>Quá trình loại bỏ các đặc trưng nhiễu gọi là trích chọn đặc trưng:</a:t>
+            </a:r>
+          </a:p>
+          <a:p>
+            <a:pPr lvl="1" algn="just" eaLnBrk="1" hangingPunct="1">
+              <a:defRPr/>
+            </a:pPr>
+            <a:r>
+              <a:rPr lang="en-US" sz="2400" smtClean="0"/>
+              <a:t>Giúp phân lớp chính xác hơn;</a:t>
+            </a:r>
+          </a:p>
+          <a:p>
+            <a:pPr lvl="1" algn="just" eaLnBrk="1" hangingPunct="1">
+              <a:defRPr/>
+            </a:pPr>
+            <a:r>
+              <a:rPr lang="en-US" sz="2400" smtClean="0"/>
+              <a:t>Tăng tốc độ (nhờ giảm khối lượng dữ liệu cần xử lý).</a:t>
+            </a:r>
           </a:p>
         </p:txBody>
       </p:sp>
@@ -7473,6 +7506,136 @@
                 <a:defRPr/>
               </a:pPr>
               <a:t>10</a:t>
+            </a:fld>
+            <a:endParaRPr lang="vi-VN"/>
+          </a:p>
+        </p:txBody>
+      </p:sp>
+    </p:spTree>
+    <p:extLst>
+      <p:ext uri="{BB962C8B-B14F-4D97-AF65-F5344CB8AC3E}">
+        <p14:creationId xmlns:p14="http://schemas.microsoft.com/office/powerpoint/2010/main" val="3390889490"/>
+      </p:ext>
+    </p:extLst>
+  </p:cSld>
+  <p:clrMapOvr>
+    <a:masterClrMapping/>
+  </p:clrMapOvr>
+  <p:timing>
+    <p:tnLst>
+      <p:par>
+        <p:cTn id="1" dur="indefinite" restart="never" nodeType="tmRoot"/>
+      </p:par>
+    </p:tnLst>
+  </p:timing>
+</p:sld>
+</file>
+
+<file path=ppt/slides/slide11.xml><?xml version="1.0" encoding="utf-8"?>
+<p:sld xmlns:a="http://schemas.openxmlformats.org/drawingml/2006/main" xmlns:r="http://schemas.openxmlformats.org/officeDocument/2006/relationships" xmlns:p="http://schemas.openxmlformats.org/presentationml/2006/main">
+  <p:cSld>
+    <p:spTree>
+      <p:nvGrpSpPr>
+        <p:cNvPr id="1" name=""/>
+        <p:cNvGrpSpPr/>
+        <p:nvPr/>
+      </p:nvGrpSpPr>
+      <p:grpSpPr>
+        <a:xfrm>
+          <a:off x="0" y="0"/>
+          <a:ext cx="0" cy="0"/>
+          <a:chOff x="0" y="0"/>
+          <a:chExt cx="0" cy="0"/>
+        </a:xfrm>
+      </p:grpSpPr>
+      <p:sp>
+        <p:nvSpPr>
+          <p:cNvPr id="6146" name="Rectangle 2"/>
+          <p:cNvSpPr>
+            <a:spLocks noGrp="1" noChangeArrowheads="1"/>
+          </p:cNvSpPr>
+          <p:nvPr>
+            <p:ph type="title"/>
+          </p:nvPr>
+        </p:nvSpPr>
+        <p:spPr/>
+        <p:txBody>
+          <a:bodyPr/>
+          <a:lstStyle/>
+          <a:p>
+            <a:pPr eaLnBrk="1" hangingPunct="1"/>
+            <a:r>
+              <a:rPr lang="en-US" sz="3600" dirty="0" err="1" smtClean="0"/>
+              <a:t>Giải</a:t>
+            </a:r>
+            <a:r>
+              <a:rPr lang="en-US" sz="3600" dirty="0" smtClean="0"/>
+              <a:t> </a:t>
+            </a:r>
+            <a:r>
+              <a:rPr lang="en-US" sz="3600" dirty="0" err="1" smtClean="0"/>
+              <a:t>thuật</a:t>
+            </a:r>
+            <a:r>
+              <a:rPr lang="en-US" sz="3600" dirty="0" smtClean="0"/>
+              <a:t> </a:t>
+            </a:r>
+            <a:r>
+              <a:rPr lang="en-US" sz="3600" dirty="0" err="1" smtClean="0"/>
+              <a:t>trích</a:t>
+            </a:r>
+            <a:r>
+              <a:rPr lang="en-US" sz="3600" dirty="0" smtClean="0"/>
+              <a:t> </a:t>
+            </a:r>
+            <a:r>
+              <a:rPr lang="en-US" sz="3600" dirty="0" err="1" smtClean="0"/>
+              <a:t>chọn</a:t>
+            </a:r>
+            <a:r>
+              <a:rPr lang="en-US" sz="3600" dirty="0" smtClean="0"/>
+              <a:t> </a:t>
+            </a:r>
+            <a:r>
+              <a:rPr lang="en-US" sz="3600" dirty="0" err="1" smtClean="0"/>
+              <a:t>đặc</a:t>
+            </a:r>
+            <a:r>
+              <a:rPr lang="en-US" sz="3600" dirty="0" smtClean="0"/>
+              <a:t> </a:t>
+            </a:r>
+            <a:r>
+              <a:rPr lang="en-US" sz="3600" dirty="0" err="1" smtClean="0"/>
+              <a:t>trưng</a:t>
+            </a:r>
+            <a:endParaRPr lang="vi-VN" sz="3600" dirty="0" smtClean="0"/>
+          </a:p>
+        </p:txBody>
+      </p:sp>
+      <p:sp>
+        <p:nvSpPr>
+          <p:cNvPr id="2" name="Slide Number Placeholder 1"/>
+          <p:cNvSpPr>
+            <a:spLocks noGrp="1"/>
+          </p:cNvSpPr>
+          <p:nvPr>
+            <p:ph type="sldNum" sz="quarter" idx="12"/>
+          </p:nvPr>
+        </p:nvSpPr>
+        <p:spPr/>
+        <p:txBody>
+          <a:bodyPr/>
+          <a:lstStyle/>
+          <a:p>
+            <a:pPr>
+              <a:defRPr/>
+            </a:pPr>
+            <a:fld id="{A81E07A1-38DA-436E-9EB2-1E501CB9FFA7}" type="slidenum">
+              <a:rPr lang="vi-VN" smtClean="0"/>
+              <a:pPr>
+                <a:defRPr/>
+              </a:pPr>
+              <a:t>11</a:t>
             </a:fld>
             <a:endParaRPr lang="vi-VN"/>
           </a:p>
@@ -7522,7 +7685,7 @@
 </p:sld>
 </file>
 
-<file path=ppt/slides/slide11.xml><?xml version="1.0" encoding="utf-8"?>
+<file path=ppt/slides/slide12.xml><?xml version="1.0" encoding="utf-8"?>
 <p:sld xmlns:a="http://schemas.openxmlformats.org/drawingml/2006/main" xmlns:r="http://schemas.openxmlformats.org/officeDocument/2006/relationships" xmlns:p="http://schemas.openxmlformats.org/presentationml/2006/main">
   <p:cSld>
     <p:spTree>
@@ -7868,7 +8031,7 @@
               <a:pPr>
                 <a:defRPr/>
               </a:pPr>
-              <a:t>11</a:t>
+              <a:t>12</a:t>
             </a:fld>
             <a:endParaRPr lang="vi-VN"/>
           </a:p>
@@ -7932,7 +8095,7 @@
 </p:sld>
 </file>
 
-<file path=ppt/slides/slide12.xml><?xml version="1.0" encoding="utf-8"?>
+<file path=ppt/slides/slide13.xml><?xml version="1.0" encoding="utf-8"?>
 <p:sld xmlns:a="http://schemas.openxmlformats.org/drawingml/2006/main" xmlns:r="http://schemas.openxmlformats.org/officeDocument/2006/relationships" xmlns:p="http://schemas.openxmlformats.org/presentationml/2006/main">
   <p:cSld>
     <p:spTree>
@@ -8054,7 +8217,7 @@
               <a:pPr>
                 <a:defRPr/>
               </a:pPr>
-              <a:t>12</a:t>
+              <a:t>13</a:t>
             </a:fld>
             <a:endParaRPr lang="vi-VN"/>
           </a:p>
@@ -8376,7 +8539,7 @@
 </p:sld>
 </file>
 
-<file path=ppt/slides/slide13.xml><?xml version="1.0" encoding="utf-8"?>
+<file path=ppt/slides/slide14.xml><?xml version="1.0" encoding="utf-8"?>
 <p:sld xmlns:a="http://schemas.openxmlformats.org/drawingml/2006/main" xmlns:r="http://schemas.openxmlformats.org/officeDocument/2006/relationships" xmlns:p="http://schemas.openxmlformats.org/presentationml/2006/main">
   <p:cSld>
     <p:spTree>
@@ -8464,7 +8627,7 @@
               <a:pPr>
                 <a:defRPr/>
               </a:pPr>
-              <a:t>13</a:t>
+              <a:t>14</a:t>
             </a:fld>
             <a:endParaRPr lang="vi-VN"/>
           </a:p>
@@ -8514,7 +8677,7 @@
 </p:sld>
 </file>
 
-<file path=ppt/slides/slide14.xml><?xml version="1.0" encoding="utf-8"?>
+<file path=ppt/slides/slide15.xml><?xml version="1.0" encoding="utf-8"?>
 <p:sld xmlns:a="http://schemas.openxmlformats.org/drawingml/2006/main" xmlns:r="http://schemas.openxmlformats.org/officeDocument/2006/relationships" xmlns:p="http://schemas.openxmlformats.org/presentationml/2006/main">
   <p:cSld>
     <p:spTree>
@@ -8630,7 +8793,7 @@
               <a:pPr>
                 <a:defRPr/>
               </a:pPr>
-              <a:t>14</a:t>
+              <a:t>15</a:t>
             </a:fld>
             <a:endParaRPr lang="vi-VN"/>
           </a:p>
@@ -8680,7 +8843,7 @@
 </p:sld>
 </file>
 
-<file path=ppt/slides/slide15.xml><?xml version="1.0" encoding="utf-8"?>
+<file path=ppt/slides/slide16.xml><?xml version="1.0" encoding="utf-8"?>
 <p:sld xmlns:a="http://schemas.openxmlformats.org/drawingml/2006/main" xmlns:r="http://schemas.openxmlformats.org/officeDocument/2006/relationships" xmlns:p="http://schemas.openxmlformats.org/presentationml/2006/main">
   <p:cSld>
     <p:spTree>
@@ -8829,7 +8992,7 @@
               <a:pPr>
                 <a:defRPr/>
               </a:pPr>
-              <a:t>15</a:t>
+              <a:t>16</a:t>
             </a:fld>
             <a:endParaRPr lang="vi-VN"/>
           </a:p>
@@ -8909,7 +9072,7 @@
 </p:sld>
 </file>
 
-<file path=ppt/slides/slide16.xml><?xml version="1.0" encoding="utf-8"?>
+<file path=ppt/slides/slide17.xml><?xml version="1.0" encoding="utf-8"?>
 <p:sld xmlns:a="http://schemas.openxmlformats.org/drawingml/2006/main" xmlns:r="http://schemas.openxmlformats.org/officeDocument/2006/relationships" xmlns:p="http://schemas.openxmlformats.org/presentationml/2006/main">
   <p:cSld>
     <p:spTree>
@@ -8973,7 +9136,7 @@
               <a:pPr>
                 <a:defRPr/>
               </a:pPr>
-              <a:t>16</a:t>
+              <a:t>17</a:t>
             </a:fld>
             <a:endParaRPr lang="vi-VN"/>
           </a:p>
@@ -9253,7 +9416,7 @@
 </p:sld>
 </file>
 
-<file path=ppt/slides/slide17.xml><?xml version="1.0" encoding="utf-8"?>
+<file path=ppt/slides/slide18.xml><?xml version="1.0" encoding="utf-8"?>
 <p:sld xmlns:a="http://schemas.openxmlformats.org/drawingml/2006/main" xmlns:r="http://schemas.openxmlformats.org/officeDocument/2006/relationships" xmlns:p="http://schemas.openxmlformats.org/presentationml/2006/main">
   <p:cSld>
     <p:spTree>
@@ -9357,7 +9520,7 @@
                   <a:tab pos="8983663" algn="l"/>
                 </a:tabLst>
               </a:pPr>
-              <a:t>17</a:t>
+              <a:t>18</a:t>
             </a:fld>
             <a:endParaRPr lang="en-US" sz="1200">
               <a:solidFill>
@@ -9617,7 +9780,7 @@
 </p:sld>
 </file>
 
-<file path=ppt/slides/slide18.xml><?xml version="1.0" encoding="utf-8"?>
+<file path=ppt/slides/slide19.xml><?xml version="1.0" encoding="utf-8"?>
 <p:sld xmlns:a="http://schemas.openxmlformats.org/drawingml/2006/main" xmlns:r="http://schemas.openxmlformats.org/officeDocument/2006/relationships" xmlns:p="http://schemas.openxmlformats.org/presentationml/2006/main">
   <p:cSld>
     <p:spTree>
@@ -9686,44 +9849,56 @@
               <a:defRPr/>
             </a:pPr>
             <a:r>
-              <a:rPr lang="en-US" sz="2400" smtClean="0"/>
-              <a:t>Hãy thiết lập </a:t>
-            </a:r>
-            <a:r>
-              <a:rPr lang="en-US" sz="2400" dirty="0" smtClean="0"/>
+              <a:rPr lang="en-US" sz="1800" smtClean="0"/>
+              <a:t>Hãy </a:t>
+            </a:r>
+            <a:r>
+              <a:rPr lang="en-US" sz="1800" smtClean="0"/>
+              <a:t>lập </a:t>
+            </a:r>
+            <a:r>
+              <a:rPr lang="en-US" sz="1800" dirty="0" smtClean="0"/>
               <a:t>ma </a:t>
             </a:r>
             <a:r>
-              <a:rPr lang="en-US" sz="2400" dirty="0" err="1" smtClean="0"/>
+              <a:rPr lang="en-US" sz="1800" dirty="0" err="1" smtClean="0"/>
               <a:t>trận</a:t>
             </a:r>
             <a:r>
-              <a:rPr lang="en-US" sz="2400" dirty="0" smtClean="0"/>
+              <a:rPr lang="en-US" sz="1800" dirty="0" smtClean="0"/>
               <a:t> </a:t>
             </a:r>
             <a:r>
-              <a:rPr lang="en-US" sz="2400" dirty="0" err="1" smtClean="0"/>
+              <a:rPr lang="en-US" sz="1800" dirty="0" err="1" smtClean="0"/>
               <a:t>nhầm</a:t>
             </a:r>
             <a:r>
-              <a:rPr lang="en-US" sz="2400" dirty="0" smtClean="0"/>
+              <a:rPr lang="en-US" sz="1800" dirty="0" smtClean="0"/>
               <a:t> </a:t>
             </a:r>
             <a:r>
-              <a:rPr lang="en-US" sz="2400" err="1" smtClean="0"/>
+              <a:rPr lang="en-US" sz="1800" err="1" smtClean="0"/>
               <a:t>lẫn</a:t>
             </a:r>
             <a:r>
-              <a:rPr lang="en-US" sz="2400" smtClean="0"/>
+              <a:rPr lang="en-US" sz="1800" smtClean="0"/>
               <a:t> cho </a:t>
             </a:r>
             <a:r>
-              <a:rPr lang="en-US" sz="2400" dirty="0" err="1" smtClean="0"/>
+              <a:rPr lang="en-US" sz="1800" dirty="0" err="1" smtClean="0"/>
               <a:t>cặp</a:t>
             </a:r>
             <a:r>
-              <a:rPr lang="en-US" sz="2400" dirty="0" smtClean="0"/>
-              <a:t> “Kyoto/JAPAN”.</a:t>
+              <a:rPr lang="en-US" sz="1800" dirty="0" smtClean="0"/>
+              <a:t> “</a:t>
+            </a:r>
+            <a:r>
+              <a:rPr lang="en-US" sz="1800" smtClean="0"/>
+              <a:t>Kyoto/JAPAN</a:t>
+            </a:r>
+            <a:r>
+              <a:rPr lang="en-US" sz="1800" smtClean="0"/>
+              <a:t>”, tương tự cặp EXPORT/poultry;</a:t>
             </a:r>
           </a:p>
           <a:p>
@@ -9731,58 +9906,64 @@
               <a:defRPr/>
             </a:pPr>
             <a:r>
-              <a:rPr lang="en-US" sz="2400" dirty="0" err="1" smtClean="0"/>
+              <a:rPr lang="en-US" sz="1800" smtClean="0"/>
+              <a:t>Hãy tính MI cho cặp Kyoto/JAPAN;</a:t>
+            </a:r>
+            <a:endParaRPr lang="en-US" sz="1800" dirty="0" smtClean="0"/>
+          </a:p>
+          <a:p>
+            <a:pPr algn="just" eaLnBrk="1" hangingPunct="1">
+              <a:defRPr/>
+            </a:pPr>
+            <a:r>
+              <a:rPr lang="en-US" sz="1800" err="1" smtClean="0"/>
               <a:t>Hãy</a:t>
             </a:r>
             <a:r>
-              <a:rPr lang="en-US" sz="2400" dirty="0" smtClean="0"/>
+              <a:rPr lang="en-US" sz="1800" smtClean="0"/>
               <a:t> </a:t>
             </a:r>
             <a:r>
-              <a:rPr lang="en-US" sz="2400" dirty="0" err="1" smtClean="0"/>
-              <a:t>thiết</a:t>
-            </a:r>
-            <a:r>
-              <a:rPr lang="en-US" sz="2400" dirty="0" smtClean="0"/>
+              <a:rPr lang="en-US" sz="1800" smtClean="0"/>
+              <a:t>thử thiết </a:t>
+            </a:r>
+            <a:r>
+              <a:rPr lang="en-US" sz="1800" dirty="0" err="1" smtClean="0"/>
+              <a:t>lập</a:t>
+            </a:r>
+            <a:r>
+              <a:rPr lang="en-US" sz="1800" dirty="0" smtClean="0"/>
+              <a:t> ma </a:t>
+            </a:r>
+            <a:r>
+              <a:rPr lang="en-US" sz="1800" dirty="0" err="1" smtClean="0"/>
+              <a:t>trận</a:t>
+            </a:r>
+            <a:r>
+              <a:rPr lang="en-US" sz="1800" dirty="0" smtClean="0"/>
               <a:t> </a:t>
             </a:r>
             <a:r>
-              <a:rPr lang="en-US" sz="2400" dirty="0" err="1" smtClean="0"/>
-              <a:t>lập</a:t>
-            </a:r>
-            <a:r>
-              <a:rPr lang="en-US" sz="2400" dirty="0" smtClean="0"/>
-              <a:t> ma </a:t>
-            </a:r>
-            <a:r>
-              <a:rPr lang="en-US" sz="2400" dirty="0" err="1" smtClean="0"/>
-              <a:t>trận</a:t>
-            </a:r>
-            <a:r>
-              <a:rPr lang="en-US" sz="2400" dirty="0" smtClean="0"/>
+              <a:rPr lang="en-US" sz="1800" dirty="0" err="1" smtClean="0"/>
+              <a:t>nhầm</a:t>
+            </a:r>
+            <a:r>
+              <a:rPr lang="en-US" sz="1800" dirty="0" smtClean="0"/>
               <a:t> </a:t>
             </a:r>
             <a:r>
-              <a:rPr lang="en-US" sz="2400" dirty="0" err="1" smtClean="0"/>
-              <a:t>nhầm</a:t>
-            </a:r>
-            <a:r>
-              <a:rPr lang="en-US" sz="2400" dirty="0" smtClean="0"/>
-              <a:t> </a:t>
-            </a:r>
-            <a:r>
-              <a:rPr lang="en-US" sz="2400" err="1" smtClean="0"/>
+              <a:rPr lang="en-US" sz="1800" err="1" smtClean="0"/>
               <a:t>lẫn</a:t>
             </a:r>
             <a:r>
-              <a:rPr lang="en-US" sz="2400" smtClean="0"/>
+              <a:rPr lang="en-US" sz="1800" smtClean="0"/>
               <a:t> bất kỳ sao cho MI </a:t>
             </a:r>
             <a:r>
-              <a:rPr lang="en-US" sz="2400" dirty="0" smtClean="0"/>
+              <a:rPr lang="en-US" sz="1800" dirty="0" smtClean="0"/>
               <a:t>= 0</a:t>
             </a:r>
-            <a:endParaRPr lang="en-US" sz="2000" dirty="0" smtClean="0"/>
+            <a:endParaRPr lang="en-US" sz="1600" dirty="0" smtClean="0"/>
           </a:p>
         </p:txBody>
       </p:sp>
@@ -9809,7 +9990,7 @@
               <a:pPr>
                 <a:defRPr/>
               </a:pPr>
-              <a:t>18</a:t>
+              <a:t>19</a:t>
             </a:fld>
             <a:endParaRPr lang="vi-VN"/>
           </a:p>
@@ -9838,7 +10019,7 @@
         </p:blipFill>
         <p:spPr bwMode="auto">
           <a:xfrm>
-            <a:off x="755576" y="2996952"/>
+            <a:off x="755576" y="3284984"/>
             <a:ext cx="7324725" cy="3457575"/>
           </a:xfrm>
           <a:prstGeom prst="rect">
@@ -9873,173 +10054,6 @@
     <p:extLst>
       <p:ext uri="{BB962C8B-B14F-4D97-AF65-F5344CB8AC3E}">
         <p14:creationId xmlns:p14="http://schemas.microsoft.com/office/powerpoint/2010/main" val="670714878"/>
-      </p:ext>
-    </p:extLst>
-  </p:cSld>
-  <p:clrMapOvr>
-    <a:masterClrMapping/>
-  </p:clrMapOvr>
-  <p:timing>
-    <p:tnLst>
-      <p:par>
-        <p:cTn id="1" dur="indefinite" restart="never" nodeType="tmRoot"/>
-      </p:par>
-    </p:tnLst>
-  </p:timing>
-</p:sld>
-</file>
-
-<file path=ppt/slides/slide19.xml><?xml version="1.0" encoding="utf-8"?>
-<p:sld xmlns:a="http://schemas.openxmlformats.org/drawingml/2006/main" xmlns:r="http://schemas.openxmlformats.org/officeDocument/2006/relationships" xmlns:p="http://schemas.openxmlformats.org/presentationml/2006/main">
-  <p:cSld>
-    <p:spTree>
-      <p:nvGrpSpPr>
-        <p:cNvPr id="1" name=""/>
-        <p:cNvGrpSpPr/>
-        <p:nvPr/>
-      </p:nvGrpSpPr>
-      <p:grpSpPr>
-        <a:xfrm>
-          <a:off x="0" y="0"/>
-          <a:ext cx="0" cy="0"/>
-          <a:chOff x="0" y="0"/>
-          <a:chExt cx="0" cy="0"/>
-        </a:xfrm>
-      </p:grpSpPr>
-      <p:sp>
-        <p:nvSpPr>
-          <p:cNvPr id="6146" name="Rectangle 2"/>
-          <p:cNvSpPr>
-            <a:spLocks noGrp="1" noChangeArrowheads="1"/>
-          </p:cNvSpPr>
-          <p:nvPr>
-            <p:ph type="title"/>
-          </p:nvPr>
-        </p:nvSpPr>
-        <p:spPr/>
-        <p:txBody>
-          <a:bodyPr/>
-          <a:lstStyle/>
-          <a:p>
-            <a:pPr eaLnBrk="1" hangingPunct="1"/>
-            <a:r>
-              <a:rPr lang="en-US" sz="3600" err="1" smtClean="0"/>
-              <a:t>Bài</a:t>
-            </a:r>
-            <a:r>
-              <a:rPr lang="en-US" sz="3600" smtClean="0"/>
-              <a:t> tập 15.2</a:t>
-            </a:r>
-            <a:endParaRPr lang="vi-VN" sz="3600" dirty="0" smtClean="0"/>
-          </a:p>
-        </p:txBody>
-      </p:sp>
-      <p:sp>
-        <p:nvSpPr>
-          <p:cNvPr id="6147" name="Rectangle 3"/>
-          <p:cNvSpPr>
-            <a:spLocks noGrp="1" noChangeArrowheads="1"/>
-          </p:cNvSpPr>
-          <p:nvPr>
-            <p:ph type="body" idx="1"/>
-          </p:nvPr>
-        </p:nvSpPr>
-        <p:spPr>
-          <a:xfrm>
-            <a:off x="467544" y="2017712"/>
-            <a:ext cx="8487544" cy="1987352"/>
-          </a:xfrm>
-        </p:spPr>
-        <p:txBody>
-          <a:bodyPr/>
-          <a:lstStyle/>
-          <a:p>
-            <a:pPr algn="just" eaLnBrk="1" hangingPunct="1">
-              <a:defRPr/>
-            </a:pPr>
-            <a:r>
-              <a:rPr lang="en-US" sz="2800" smtClean="0"/>
-              <a:t>Hãy tính I(U</a:t>
-            </a:r>
-            <a:r>
-              <a:rPr lang="en-US" sz="2800" baseline="-25000" smtClean="0"/>
-              <a:t>t</a:t>
-            </a:r>
-            <a:r>
-              <a:rPr lang="en-US" sz="2800" smtClean="0"/>
-              <a:t>, C</a:t>
-            </a:r>
-            <a:r>
-              <a:rPr lang="en-US" sz="2800" baseline="-25000" smtClean="0"/>
-              <a:t>c</a:t>
-            </a:r>
-            <a:r>
-              <a:rPr lang="en-US" sz="2800" smtClean="0"/>
-              <a:t>) và X</a:t>
-            </a:r>
-            <a:r>
-              <a:rPr lang="en-US" sz="2800" baseline="30000" smtClean="0"/>
-              <a:t>2</a:t>
-            </a:r>
-            <a:r>
-              <a:rPr lang="en-US" sz="2800" smtClean="0"/>
-              <a:t>(D, t, c) trong hai trường hợp:</a:t>
-            </a:r>
-          </a:p>
-          <a:p>
-            <a:pPr lvl="1" algn="just" eaLnBrk="1" hangingPunct="1">
-              <a:defRPr/>
-            </a:pPr>
-            <a:r>
-              <a:rPr lang="en-US" sz="2400" smtClean="0"/>
-              <a:t>Từ t và lớp c hoàn toàn độc lập;</a:t>
-            </a:r>
-          </a:p>
-          <a:p>
-            <a:pPr lvl="1" algn="just" eaLnBrk="1" hangingPunct="1">
-              <a:defRPr/>
-            </a:pPr>
-            <a:r>
-              <a:rPr lang="en-US" sz="2400" smtClean="0"/>
-              <a:t>Từ t và lớp c hoàn toàn phụ thuộc.</a:t>
-            </a:r>
-            <a:endParaRPr lang="en-US" sz="2400" dirty="0" smtClean="0"/>
-          </a:p>
-        </p:txBody>
-      </p:sp>
-      <p:sp>
-        <p:nvSpPr>
-          <p:cNvPr id="2" name="Slide Number Placeholder 1"/>
-          <p:cNvSpPr>
-            <a:spLocks noGrp="1"/>
-          </p:cNvSpPr>
-          <p:nvPr>
-            <p:ph type="sldNum" sz="quarter" idx="12"/>
-          </p:nvPr>
-        </p:nvSpPr>
-        <p:spPr/>
-        <p:txBody>
-          <a:bodyPr/>
-          <a:lstStyle/>
-          <a:p>
-            <a:pPr>
-              <a:defRPr/>
-            </a:pPr>
-            <a:fld id="{A81E07A1-38DA-436E-9EB2-1E501CB9FFA7}" type="slidenum">
-              <a:rPr lang="vi-VN" smtClean="0"/>
-              <a:pPr>
-                <a:defRPr/>
-              </a:pPr>
-              <a:t>19</a:t>
-            </a:fld>
-            <a:endParaRPr lang="vi-VN"/>
-          </a:p>
-        </p:txBody>
-      </p:sp>
-    </p:spTree>
-    <p:extLst>
-      <p:ext uri="{BB962C8B-B14F-4D97-AF65-F5344CB8AC3E}">
-        <p14:creationId xmlns:p14="http://schemas.microsoft.com/office/powerpoint/2010/main" val="2661154620"/>
       </p:ext>
     </p:extLst>
   </p:cSld>
@@ -10312,7 +10326,7 @@
             </a:r>
             <a:r>
               <a:rPr lang="en-US" sz="3600" smtClean="0"/>
-              <a:t> tập 15.3</a:t>
+              <a:t> tập 15.2</a:t>
             </a:r>
             <a:endParaRPr lang="vi-VN" sz="3600" dirty="0" smtClean="0"/>
           </a:p>
@@ -10330,21 +10344,62 @@
         </p:nvSpPr>
         <p:spPr>
           <a:xfrm>
-            <a:off x="683568" y="2017712"/>
-            <a:ext cx="8271520" cy="979240"/>
+            <a:off x="467544" y="2017712"/>
+            <a:ext cx="8487544" cy="1987352"/>
           </a:xfrm>
         </p:spPr>
         <p:txBody>
           <a:bodyPr/>
           <a:lstStyle/>
           <a:p>
-            <a:pPr marL="0" indent="0" algn="just" eaLnBrk="1" hangingPunct="1">
-              <a:buNone/>
+            <a:pPr algn="just" eaLnBrk="1" hangingPunct="1">
               <a:defRPr/>
             </a:pPr>
             <a:r>
               <a:rPr lang="en-US" sz="2800" smtClean="0"/>
-              <a:t>Cho dữ liệu thống kê đối với bốn từ của lớp coffee như sau:</a:t>
+              <a:t>Hãy tính I(U</a:t>
+            </a:r>
+            <a:r>
+              <a:rPr lang="en-US" sz="2800" baseline="-25000" smtClean="0"/>
+              <a:t>t</a:t>
+            </a:r>
+            <a:r>
+              <a:rPr lang="en-US" sz="2800" smtClean="0"/>
+              <a:t>, C</a:t>
+            </a:r>
+            <a:r>
+              <a:rPr lang="en-US" sz="2800" baseline="-25000" smtClean="0"/>
+              <a:t>c</a:t>
+            </a:r>
+            <a:r>
+              <a:rPr lang="en-US" sz="2800" smtClean="0"/>
+              <a:t>) và X</a:t>
+            </a:r>
+            <a:r>
+              <a:rPr lang="en-US" sz="2800" baseline="30000" smtClean="0"/>
+              <a:t>2</a:t>
+            </a:r>
+            <a:r>
+              <a:rPr lang="en-US" sz="2800" smtClean="0"/>
+              <a:t>(D, t, c) trong hai trường hợp:</a:t>
+            </a:r>
+          </a:p>
+          <a:p>
+            <a:pPr lvl="1" algn="just" eaLnBrk="1" hangingPunct="1">
+              <a:defRPr/>
+            </a:pPr>
+            <a:r>
+              <a:rPr lang="en-US" sz="2400" smtClean="0"/>
+              <a:t>Từ t và lớp c hoàn toàn độc lập;</a:t>
+            </a:r>
+          </a:p>
+          <a:p>
+            <a:pPr lvl="1" algn="just" eaLnBrk="1" hangingPunct="1">
+              <a:defRPr/>
+            </a:pPr>
+            <a:r>
+              <a:rPr lang="en-US" sz="2400" smtClean="0"/>
+              <a:t>Từ t và lớp c hoàn toàn phụ thuộc.</a:t>
             </a:r>
             <a:endParaRPr lang="en-US" sz="2400" dirty="0" smtClean="0"/>
           </a:p>
@@ -10374,6 +10429,132 @@
                 <a:defRPr/>
               </a:pPr>
               <a:t>20</a:t>
+            </a:fld>
+            <a:endParaRPr lang="vi-VN"/>
+          </a:p>
+        </p:txBody>
+      </p:sp>
+    </p:spTree>
+    <p:extLst>
+      <p:ext uri="{BB962C8B-B14F-4D97-AF65-F5344CB8AC3E}">
+        <p14:creationId xmlns:p14="http://schemas.microsoft.com/office/powerpoint/2010/main" val="2661154620"/>
+      </p:ext>
+    </p:extLst>
+  </p:cSld>
+  <p:clrMapOvr>
+    <a:masterClrMapping/>
+  </p:clrMapOvr>
+  <p:timing>
+    <p:tnLst>
+      <p:par>
+        <p:cTn id="1" dur="indefinite" restart="never" nodeType="tmRoot"/>
+      </p:par>
+    </p:tnLst>
+  </p:timing>
+</p:sld>
+</file>
+
+<file path=ppt/slides/slide21.xml><?xml version="1.0" encoding="utf-8"?>
+<p:sld xmlns:a="http://schemas.openxmlformats.org/drawingml/2006/main" xmlns:r="http://schemas.openxmlformats.org/officeDocument/2006/relationships" xmlns:p="http://schemas.openxmlformats.org/presentationml/2006/main">
+  <p:cSld>
+    <p:spTree>
+      <p:nvGrpSpPr>
+        <p:cNvPr id="1" name=""/>
+        <p:cNvGrpSpPr/>
+        <p:nvPr/>
+      </p:nvGrpSpPr>
+      <p:grpSpPr>
+        <a:xfrm>
+          <a:off x="0" y="0"/>
+          <a:ext cx="0" cy="0"/>
+          <a:chOff x="0" y="0"/>
+          <a:chExt cx="0" cy="0"/>
+        </a:xfrm>
+      </p:grpSpPr>
+      <p:sp>
+        <p:nvSpPr>
+          <p:cNvPr id="6146" name="Rectangle 2"/>
+          <p:cNvSpPr>
+            <a:spLocks noGrp="1" noChangeArrowheads="1"/>
+          </p:cNvSpPr>
+          <p:nvPr>
+            <p:ph type="title"/>
+          </p:nvPr>
+        </p:nvSpPr>
+        <p:spPr/>
+        <p:txBody>
+          <a:bodyPr/>
+          <a:lstStyle/>
+          <a:p>
+            <a:pPr eaLnBrk="1" hangingPunct="1"/>
+            <a:r>
+              <a:rPr lang="en-US" sz="3600" err="1" smtClean="0"/>
+              <a:t>Bài</a:t>
+            </a:r>
+            <a:r>
+              <a:rPr lang="en-US" sz="3600" smtClean="0"/>
+              <a:t> tập 15.3</a:t>
+            </a:r>
+            <a:endParaRPr lang="vi-VN" sz="3600" dirty="0" smtClean="0"/>
+          </a:p>
+        </p:txBody>
+      </p:sp>
+      <p:sp>
+        <p:nvSpPr>
+          <p:cNvPr id="6147" name="Rectangle 3"/>
+          <p:cNvSpPr>
+            <a:spLocks noGrp="1" noChangeArrowheads="1"/>
+          </p:cNvSpPr>
+          <p:nvPr>
+            <p:ph type="body" idx="1"/>
+          </p:nvPr>
+        </p:nvSpPr>
+        <p:spPr>
+          <a:xfrm>
+            <a:off x="683568" y="2017712"/>
+            <a:ext cx="8271520" cy="979240"/>
+          </a:xfrm>
+        </p:spPr>
+        <p:txBody>
+          <a:bodyPr/>
+          <a:lstStyle/>
+          <a:p>
+            <a:pPr marL="0" indent="0" algn="just" eaLnBrk="1" hangingPunct="1">
+              <a:buNone/>
+              <a:defRPr/>
+            </a:pPr>
+            <a:r>
+              <a:rPr lang="en-US" sz="2800" smtClean="0"/>
+              <a:t>Cho dữ liệu thống kê đối với bốn từ của lớp coffee như sau:</a:t>
+            </a:r>
+            <a:endParaRPr lang="en-US" sz="2400" dirty="0" smtClean="0"/>
+          </a:p>
+        </p:txBody>
+      </p:sp>
+      <p:sp>
+        <p:nvSpPr>
+          <p:cNvPr id="2" name="Slide Number Placeholder 1"/>
+          <p:cNvSpPr>
+            <a:spLocks noGrp="1"/>
+          </p:cNvSpPr>
+          <p:nvPr>
+            <p:ph type="sldNum" sz="quarter" idx="12"/>
+          </p:nvPr>
+        </p:nvSpPr>
+        <p:spPr/>
+        <p:txBody>
+          <a:bodyPr/>
+          <a:lstStyle/>
+          <a:p>
+            <a:pPr>
+              <a:defRPr/>
+            </a:pPr>
+            <a:fld id="{A81E07A1-38DA-436E-9EB2-1E501CB9FFA7}" type="slidenum">
+              <a:rPr lang="vi-VN" smtClean="0"/>
+              <a:pPr>
+                <a:defRPr/>
+              </a:pPr>
+              <a:t>21</a:t>
             </a:fld>
             <a:endParaRPr lang="vi-VN"/>
           </a:p>
@@ -10707,7 +10888,7 @@
 </p:sld>
 </file>
 
-<file path=ppt/slides/slide21.xml><?xml version="1.0" encoding="utf-8"?>
+<file path=ppt/slides/slide22.xml><?xml version="1.0" encoding="utf-8"?>
 <p:sld xmlns:a="http://schemas.openxmlformats.org/drawingml/2006/main" xmlns:r="http://schemas.openxmlformats.org/officeDocument/2006/relationships" xmlns:p="http://schemas.openxmlformats.org/presentationml/2006/main">
   <p:cSld>
     <p:spTree>
@@ -10881,7 +11062,7 @@
               <a:pPr>
                 <a:defRPr/>
               </a:pPr>
-              <a:t>21</a:t>
+              <a:t>22</a:t>
             </a:fld>
             <a:endParaRPr lang="vi-VN"/>
           </a:p>
@@ -10907,7 +11088,7 @@
 </p:sld>
 </file>
 
-<file path=ppt/slides/slide22.xml><?xml version="1.0" encoding="utf-8"?>
+<file path=ppt/slides/slide23.xml><?xml version="1.0" encoding="utf-8"?>
 <p:sld xmlns:a="http://schemas.openxmlformats.org/drawingml/2006/main" xmlns:r="http://schemas.openxmlformats.org/officeDocument/2006/relationships" xmlns:p="http://schemas.openxmlformats.org/presentationml/2006/main">
   <p:cSld>
     <p:spTree>
@@ -10946,11 +11127,7 @@
             </a:r>
             <a:r>
               <a:rPr lang="en-US" sz="3600" smtClean="0"/>
-              <a:t> tập </a:t>
-            </a:r>
-            <a:r>
-              <a:rPr lang="en-US" sz="3600" smtClean="0"/>
-              <a:t>15.5</a:t>
+              <a:t> tập 15.5</a:t>
             </a:r>
             <a:endParaRPr lang="vi-VN" sz="3600" dirty="0" smtClean="0"/>
           </a:p>
@@ -11021,7 +11198,7 @@
               <a:pPr>
                 <a:defRPr/>
               </a:pPr>
-              <a:t>22</a:t>
+              <a:t>23</a:t>
             </a:fld>
             <a:endParaRPr lang="vi-VN"/>
           </a:p>
@@ -11101,7 +11278,7 @@
 </p:sld>
 </file>
 
-<file path=ppt/slides/slide23.xml><?xml version="1.0" encoding="utf-8"?>
+<file path=ppt/slides/slide24.xml><?xml version="1.0" encoding="utf-8"?>
 <p:sld xmlns:a="http://schemas.openxmlformats.org/drawingml/2006/main" xmlns:r="http://schemas.openxmlformats.org/officeDocument/2006/relationships" xmlns:p="http://schemas.openxmlformats.org/presentationml/2006/main">
   <p:cSld>
     <p:spTree>
@@ -11215,7 +11392,7 @@
               <a:pPr>
                 <a:defRPr/>
               </a:pPr>
-              <a:t>23</a:t>
+              <a:t>24</a:t>
             </a:fld>
             <a:endParaRPr lang="vi-VN"/>
           </a:p>
@@ -12880,9 +13057,9 @@
       </p:grpSpPr>
       <p:sp>
         <p:nvSpPr>
-          <p:cNvPr id="6146" name="Rectangle 2"/>
+          <p:cNvPr id="2" name="Title 1"/>
           <p:cNvSpPr>
-            <a:spLocks noGrp="1" noChangeArrowheads="1"/>
+            <a:spLocks noGrp="1"/>
           </p:cNvSpPr>
           <p:nvPr>
             <p:ph type="title"/>
@@ -12893,109 +13070,17 @@
           <a:bodyPr/>
           <a:lstStyle/>
           <a:p>
-            <a:pPr eaLnBrk="1" hangingPunct="1"/>
-            <a:r>
-              <a:rPr lang="en-US" sz="3600" dirty="0" err="1" smtClean="0"/>
-              <a:t>Nội</a:t>
-            </a:r>
-            <a:r>
-              <a:rPr lang="en-US" sz="3600" dirty="0" smtClean="0"/>
-              <a:t> dung </a:t>
-            </a:r>
-            <a:r>
-              <a:rPr lang="en-US" sz="3600" dirty="0" err="1" smtClean="0"/>
-              <a:t>chính</a:t>
-            </a:r>
-            <a:endParaRPr lang="vi-VN" sz="3600" dirty="0" smtClean="0"/>
-          </a:p>
-        </p:txBody>
-      </p:sp>
-      <p:sp>
-        <p:nvSpPr>
-          <p:cNvPr id="6147" name="Rectangle 3"/>
-          <p:cNvSpPr>
-            <a:spLocks noGrp="1" noChangeArrowheads="1"/>
-          </p:cNvSpPr>
-          <p:nvPr>
-            <p:ph type="body" idx="1"/>
-          </p:nvPr>
-        </p:nvSpPr>
-        <p:spPr>
-          <a:xfrm>
-            <a:off x="611560" y="2017713"/>
-            <a:ext cx="8343528" cy="4114800"/>
-          </a:xfrm>
-        </p:spPr>
-        <p:txBody>
-          <a:bodyPr/>
-          <a:lstStyle/>
-          <a:p>
-            <a:pPr algn="just" eaLnBrk="1" hangingPunct="1">
-              <a:defRPr/>
-            </a:pPr>
-            <a:r>
-              <a:rPr lang="en-US" sz="2800" smtClean="0">
-                <a:solidFill>
-                  <a:schemeClr val="bg1">
-                    <a:lumMod val="65000"/>
-                  </a:schemeClr>
-                </a:solidFill>
-              </a:rPr>
-              <a:t>Các mô hình </a:t>
-            </a:r>
-            <a:r>
-              <a:rPr lang="en-US" sz="2800" dirty="0" smtClean="0">
-                <a:solidFill>
-                  <a:schemeClr val="bg1">
-                    <a:lumMod val="65000"/>
-                  </a:schemeClr>
-                </a:solidFill>
-              </a:rPr>
-              <a:t>Naïve Bayes;</a:t>
-            </a:r>
-          </a:p>
-          <a:p>
-            <a:pPr algn="just" eaLnBrk="1" hangingPunct="1">
-              <a:defRPr/>
-            </a:pPr>
-            <a:r>
-              <a:rPr lang="en-US" sz="2800" dirty="0" err="1" smtClean="0"/>
-              <a:t>Trích</a:t>
-            </a:r>
-            <a:r>
-              <a:rPr lang="en-US" sz="2800" dirty="0" smtClean="0"/>
-              <a:t> </a:t>
-            </a:r>
-            <a:r>
-              <a:rPr lang="en-US" sz="2800" dirty="0" err="1" smtClean="0"/>
-              <a:t>chọn</a:t>
-            </a:r>
-            <a:r>
-              <a:rPr lang="en-US" sz="2800" dirty="0" smtClean="0"/>
-              <a:t> </a:t>
-            </a:r>
-            <a:r>
-              <a:rPr lang="en-US" sz="2800" dirty="0" err="1" smtClean="0"/>
-              <a:t>đặc</a:t>
-            </a:r>
-            <a:r>
-              <a:rPr lang="en-US" sz="2800" dirty="0" smtClean="0"/>
-              <a:t> </a:t>
-            </a:r>
-            <a:r>
-              <a:rPr lang="en-US" sz="2800" dirty="0" err="1" smtClean="0"/>
-              <a:t>trưng</a:t>
-            </a:r>
-            <a:r>
-              <a:rPr lang="en-US" sz="2800" dirty="0" smtClean="0"/>
-              <a:t>.</a:t>
-            </a:r>
-          </a:p>
-        </p:txBody>
-      </p:sp>
-      <p:sp>
-        <p:nvSpPr>
-          <p:cNvPr id="2" name="Slide Number Placeholder 1"/>
+            <a:r>
+              <a:rPr lang="en-US" smtClean="0"/>
+              <a:t>Bernouli NB</a:t>
+            </a:r>
+            <a:endParaRPr lang="vi-VN"/>
+          </a:p>
+        </p:txBody>
+      </p:sp>
+      <p:sp>
+        <p:nvSpPr>
+          <p:cNvPr id="4" name="Slide Number Placeholder 3"/>
           <p:cNvSpPr>
             <a:spLocks noGrp="1"/>
           </p:cNvSpPr>
@@ -13011,7 +13096,7 @@
             <a:pPr>
               <a:defRPr/>
             </a:pPr>
-            <a:fld id="{A81E07A1-38DA-436E-9EB2-1E501CB9FFA7}" type="slidenum">
+            <a:fld id="{18D75DDA-CB64-4086-83FF-BB38D2754AC9}" type="slidenum">
               <a:rPr lang="vi-VN" smtClean="0"/>
               <a:pPr>
                 <a:defRPr/>
@@ -13022,23 +13107,178 @@
           </a:p>
         </p:txBody>
       </p:sp>
+      <p:pic>
+        <p:nvPicPr>
+          <p:cNvPr id="1026" name="Picture 2"/>
+          <p:cNvPicPr>
+            <a:picLocks noChangeAspect="1" noChangeArrowheads="1"/>
+          </p:cNvPicPr>
+          <p:nvPr/>
+        </p:nvPicPr>
+        <p:blipFill>
+          <a:blip r:embed="rId2">
+            <a:extLst>
+              <a:ext uri="{28A0092B-C50C-407E-A947-70E740481C1C}">
+                <a14:useLocalDpi xmlns:a14="http://schemas.microsoft.com/office/drawing/2010/main" val="0"/>
+              </a:ext>
+            </a:extLst>
+          </a:blip>
+          <a:srcRect/>
+          <a:stretch>
+            <a:fillRect/>
+          </a:stretch>
+        </p:blipFill>
+        <p:spPr bwMode="auto">
+          <a:xfrm>
+            <a:off x="1187623" y="1772816"/>
+            <a:ext cx="6794399" cy="1728192"/>
+          </a:xfrm>
+          <a:prstGeom prst="rect">
+            <a:avLst/>
+          </a:prstGeom>
+          <a:noFill/>
+          <a:ln>
+            <a:noFill/>
+          </a:ln>
+          <a:extLst>
+            <a:ext uri="{909E8E84-426E-40DD-AFC4-6F175D3DCCD1}">
+              <a14:hiddenFill xmlns:a14="http://schemas.microsoft.com/office/drawing/2010/main">
+                <a:solidFill>
+                  <a:schemeClr val="accent1"/>
+                </a:solidFill>
+              </a14:hiddenFill>
+            </a:ext>
+            <a:ext uri="{91240B29-F687-4F45-9708-019B960494DF}">
+              <a14:hiddenLine xmlns:a14="http://schemas.microsoft.com/office/drawing/2010/main" w="9525">
+                <a:solidFill>
+                  <a:schemeClr val="tx1"/>
+                </a:solidFill>
+                <a:miter lim="800000"/>
+                <a:headEnd/>
+                <a:tailEnd/>
+              </a14:hiddenLine>
+            </a:ext>
+          </a:extLst>
+        </p:spPr>
+      </p:pic>
+      <p:pic>
+        <p:nvPicPr>
+          <p:cNvPr id="1027" name="Picture 3"/>
+          <p:cNvPicPr>
+            <a:picLocks noChangeAspect="1" noChangeArrowheads="1"/>
+          </p:cNvPicPr>
+          <p:nvPr/>
+        </p:nvPicPr>
+        <p:blipFill>
+          <a:blip r:embed="rId3">
+            <a:extLst>
+              <a:ext uri="{28A0092B-C50C-407E-A947-70E740481C1C}">
+                <a14:useLocalDpi xmlns:a14="http://schemas.microsoft.com/office/drawing/2010/main" val="0"/>
+              </a:ext>
+            </a:extLst>
+          </a:blip>
+          <a:srcRect/>
+          <a:stretch>
+            <a:fillRect/>
+          </a:stretch>
+        </p:blipFill>
+        <p:spPr bwMode="auto">
+          <a:xfrm>
+            <a:off x="1187623" y="3491096"/>
+            <a:ext cx="6360752" cy="1954128"/>
+          </a:xfrm>
+          <a:prstGeom prst="rect">
+            <a:avLst/>
+          </a:prstGeom>
+          <a:noFill/>
+          <a:ln>
+            <a:noFill/>
+          </a:ln>
+          <a:extLst>
+            <a:ext uri="{909E8E84-426E-40DD-AFC4-6F175D3DCCD1}">
+              <a14:hiddenFill xmlns:a14="http://schemas.microsoft.com/office/drawing/2010/main">
+                <a:solidFill>
+                  <a:schemeClr val="accent1"/>
+                </a:solidFill>
+              </a14:hiddenFill>
+            </a:ext>
+            <a:ext uri="{91240B29-F687-4F45-9708-019B960494DF}">
+              <a14:hiddenLine xmlns:a14="http://schemas.microsoft.com/office/drawing/2010/main" w="9525">
+                <a:solidFill>
+                  <a:schemeClr val="tx1"/>
+                </a:solidFill>
+                <a:miter lim="800000"/>
+                <a:headEnd/>
+                <a:tailEnd/>
+              </a14:hiddenLine>
+            </a:ext>
+          </a:extLst>
+        </p:spPr>
+      </p:pic>
+      <p:pic>
+        <p:nvPicPr>
+          <p:cNvPr id="1028" name="Picture 4"/>
+          <p:cNvPicPr>
+            <a:picLocks noChangeAspect="1" noChangeArrowheads="1"/>
+          </p:cNvPicPr>
+          <p:nvPr/>
+        </p:nvPicPr>
+        <p:blipFill>
+          <a:blip r:embed="rId4">
+            <a:extLst>
+              <a:ext uri="{28A0092B-C50C-407E-A947-70E740481C1C}">
+                <a14:useLocalDpi xmlns:a14="http://schemas.microsoft.com/office/drawing/2010/main" val="0"/>
+              </a:ext>
+            </a:extLst>
+          </a:blip>
+          <a:srcRect/>
+          <a:stretch>
+            <a:fillRect/>
+          </a:stretch>
+        </p:blipFill>
+        <p:spPr bwMode="auto">
+          <a:xfrm>
+            <a:off x="1187623" y="5478368"/>
+            <a:ext cx="6778100" cy="1263000"/>
+          </a:xfrm>
+          <a:prstGeom prst="rect">
+            <a:avLst/>
+          </a:prstGeom>
+          <a:noFill/>
+          <a:ln>
+            <a:noFill/>
+          </a:ln>
+          <a:extLst>
+            <a:ext uri="{909E8E84-426E-40DD-AFC4-6F175D3DCCD1}">
+              <a14:hiddenFill xmlns:a14="http://schemas.microsoft.com/office/drawing/2010/main">
+                <a:solidFill>
+                  <a:schemeClr val="accent1"/>
+                </a:solidFill>
+              </a14:hiddenFill>
+            </a:ext>
+            <a:ext uri="{91240B29-F687-4F45-9708-019B960494DF}">
+              <a14:hiddenLine xmlns:a14="http://schemas.microsoft.com/office/drawing/2010/main" w="9525">
+                <a:solidFill>
+                  <a:schemeClr val="tx1"/>
+                </a:solidFill>
+                <a:miter lim="800000"/>
+                <a:headEnd/>
+                <a:tailEnd/>
+              </a14:hiddenLine>
+            </a:ext>
+          </a:extLst>
+        </p:spPr>
+      </p:pic>
     </p:spTree>
     <p:extLst>
       <p:ext uri="{BB962C8B-B14F-4D97-AF65-F5344CB8AC3E}">
-        <p14:creationId xmlns:p14="http://schemas.microsoft.com/office/powerpoint/2010/main" val="2313394124"/>
+        <p14:creationId xmlns:p14="http://schemas.microsoft.com/office/powerpoint/2010/main" val="1909251185"/>
       </p:ext>
     </p:extLst>
   </p:cSld>
   <p:clrMapOvr>
     <a:masterClrMapping/>
   </p:clrMapOvr>
-  <p:timing>
-    <p:tnLst>
-      <p:par>
-        <p:cTn id="1" dur="indefinite" restart="never" nodeType="tmRoot"/>
-      </p:par>
-    </p:tnLst>
-  </p:timing>
 </p:sld>
 </file>
 
@@ -13077,23 +13317,15 @@
             <a:pPr eaLnBrk="1" hangingPunct="1"/>
             <a:r>
               <a:rPr lang="en-US" sz="3600" dirty="0" err="1" smtClean="0"/>
-              <a:t>Đặc</a:t>
+              <a:t>Nội</a:t>
             </a:r>
             <a:r>
               <a:rPr lang="en-US" sz="3600" dirty="0" smtClean="0"/>
-              <a:t> </a:t>
+              <a:t> dung </a:t>
             </a:r>
             <a:r>
               <a:rPr lang="en-US" sz="3600" dirty="0" err="1" smtClean="0"/>
-              <a:t>trưng</a:t>
-            </a:r>
-            <a:r>
-              <a:rPr lang="en-US" sz="3600" dirty="0" smtClean="0"/>
-              <a:t> </a:t>
-            </a:r>
-            <a:r>
-              <a:rPr lang="en-US" sz="3600" dirty="0" err="1" smtClean="0"/>
-              <a:t>nhiễu</a:t>
+              <a:t>chính</a:t>
             </a:r>
             <a:endParaRPr lang="vi-VN" sz="3600" dirty="0" smtClean="0"/>
           </a:p>
@@ -13111,8 +13343,8 @@
         </p:nvSpPr>
         <p:spPr>
           <a:xfrm>
-            <a:off x="467544" y="2017712"/>
-            <a:ext cx="8487544" cy="4683125"/>
+            <a:off x="611560" y="2017713"/>
+            <a:ext cx="8343528" cy="4114800"/>
           </a:xfrm>
         </p:spPr>
         <p:txBody>
@@ -13123,20 +13355,24 @@
               <a:defRPr/>
             </a:pPr>
             <a:r>
-              <a:rPr lang="en-US" sz="2800"/>
-              <a:t>Đặc trưng nhiễu là những </a:t>
-            </a:r>
-            <a:r>
-              <a:rPr lang="en-US" sz="2800" smtClean="0"/>
-              <a:t>đặc trưng mà </a:t>
-            </a:r>
-            <a:r>
-              <a:rPr lang="en-US" sz="2800"/>
-              <a:t>khi thêm vào văn bản sẽ làm tăng lỗi phân lớp</a:t>
-            </a:r>
-            <a:r>
-              <a:rPr lang="en-US" sz="2800" smtClean="0"/>
-              <a:t>;</a:t>
+              <a:rPr lang="en-US" sz="2800" smtClean="0">
+                <a:solidFill>
+                  <a:schemeClr val="bg1">
+                    <a:lumMod val="65000"/>
+                  </a:schemeClr>
+                </a:solidFill>
+              </a:rPr>
+              <a:t>Các mô hình </a:t>
+            </a:r>
+            <a:r>
+              <a:rPr lang="en-US" sz="2800" dirty="0" smtClean="0">
+                <a:solidFill>
+                  <a:schemeClr val="bg1">
+                    <a:lumMod val="65000"/>
+                  </a:schemeClr>
+                </a:solidFill>
+              </a:rPr>
+              <a:t>Naïve Bayes;</a:t>
             </a:r>
           </a:p>
           <a:p>
@@ -13144,12 +13380,8 @@
               <a:defRPr/>
             </a:pPr>
             <a:r>
-              <a:rPr lang="en-US" sz="2800" smtClean="0"/>
-              <a:t>Giả </a:t>
-            </a:r>
-            <a:r>
               <a:rPr lang="en-US" sz="2800" dirty="0" err="1" smtClean="0"/>
-              <a:t>sử</a:t>
+              <a:t>Trích</a:t>
             </a:r>
             <a:r>
               <a:rPr lang="en-US" sz="2800" dirty="0" smtClean="0"/>
@@ -13157,7 +13389,7 @@
             </a:r>
             <a:r>
               <a:rPr lang="en-US" sz="2800" dirty="0" err="1" smtClean="0"/>
-              <a:t>một</a:t>
+              <a:t>chọn</a:t>
             </a:r>
             <a:r>
               <a:rPr lang="en-US" sz="2800" dirty="0" smtClean="0"/>
@@ -13165,7 +13397,7 @@
             </a:r>
             <a:r>
               <a:rPr lang="en-US" sz="2800" dirty="0" err="1" smtClean="0"/>
-              <a:t>từ</a:t>
+              <a:t>đặc</a:t>
             </a:r>
             <a:r>
               <a:rPr lang="en-US" sz="2800" dirty="0" smtClean="0"/>
@@ -13173,375 +13405,12 @@
             </a:r>
             <a:r>
               <a:rPr lang="en-US" sz="2800" dirty="0" err="1" smtClean="0"/>
-              <a:t>hiếm</a:t>
+              <a:t>trưng</a:t>
             </a:r>
             <a:r>
               <a:rPr lang="en-US" sz="2800" dirty="0" smtClean="0"/>
-              <a:t> t </a:t>
-            </a:r>
-            <a:r>
-              <a:rPr lang="en-US" sz="2800" dirty="0" err="1" smtClean="0"/>
-              <a:t>không</a:t>
-            </a:r>
-            <a:r>
-              <a:rPr lang="en-US" sz="2800" dirty="0" smtClean="0"/>
-              <a:t> </a:t>
-            </a:r>
-            <a:r>
-              <a:rPr lang="en-US" sz="2800" dirty="0" err="1" smtClean="0"/>
-              <a:t>chứa</a:t>
-            </a:r>
-            <a:r>
-              <a:rPr lang="en-US" sz="2800" dirty="0" smtClean="0"/>
-              <a:t> </a:t>
-            </a:r>
-            <a:r>
-              <a:rPr lang="en-US" sz="2800" dirty="0" err="1" smtClean="0"/>
-              <a:t>thông</a:t>
-            </a:r>
-            <a:r>
-              <a:rPr lang="en-US" sz="2800" dirty="0" smtClean="0"/>
-              <a:t> tin </a:t>
-            </a:r>
-            <a:r>
-              <a:rPr lang="en-US" sz="2800" dirty="0" err="1" smtClean="0"/>
-              <a:t>liên</a:t>
-            </a:r>
-            <a:r>
-              <a:rPr lang="en-US" sz="2800" dirty="0" smtClean="0"/>
-              <a:t> </a:t>
-            </a:r>
-            <a:r>
-              <a:rPr lang="en-US" sz="2800" dirty="0" err="1" smtClean="0"/>
-              <a:t>quan</a:t>
-            </a:r>
-            <a:r>
-              <a:rPr lang="en-US" sz="2800" dirty="0" smtClean="0"/>
-              <a:t> </a:t>
-            </a:r>
-            <a:r>
-              <a:rPr lang="en-US" sz="2800" dirty="0" err="1" smtClean="0"/>
-              <a:t>đến</a:t>
-            </a:r>
-            <a:r>
-              <a:rPr lang="en-US" sz="2800" dirty="0" smtClean="0"/>
-              <a:t> </a:t>
-            </a:r>
-            <a:r>
-              <a:rPr lang="en-US" sz="2800" dirty="0" err="1" smtClean="0"/>
-              <a:t>lớp</a:t>
-            </a:r>
-            <a:r>
-              <a:rPr lang="en-US" sz="2800" dirty="0" smtClean="0"/>
-              <a:t> c </a:t>
-            </a:r>
-            <a:r>
-              <a:rPr lang="en-US" sz="2800" err="1" smtClean="0"/>
-              <a:t>nhưng</a:t>
-            </a:r>
-            <a:r>
-              <a:rPr lang="en-US" sz="2800" smtClean="0"/>
-              <a:t> lại </a:t>
-            </a:r>
-            <a:r>
-              <a:rPr lang="en-US" sz="2800" dirty="0" err="1" smtClean="0"/>
-              <a:t>xuất</a:t>
-            </a:r>
-            <a:r>
-              <a:rPr lang="en-US" sz="2800" dirty="0" smtClean="0"/>
-              <a:t> </a:t>
-            </a:r>
-            <a:r>
-              <a:rPr lang="en-US" sz="2800" dirty="0" err="1" smtClean="0"/>
-              <a:t>hiện</a:t>
-            </a:r>
-            <a:r>
-              <a:rPr lang="en-US" sz="2800" dirty="0" smtClean="0"/>
-              <a:t> </a:t>
-            </a:r>
-            <a:r>
-              <a:rPr lang="en-US" sz="2800" dirty="0" err="1" smtClean="0"/>
-              <a:t>trong</a:t>
-            </a:r>
-            <a:r>
-              <a:rPr lang="en-US" sz="2800" dirty="0" smtClean="0"/>
-              <a:t> </a:t>
-            </a:r>
-            <a:r>
-              <a:rPr lang="en-US" sz="2800" dirty="0" err="1" smtClean="0"/>
-              <a:t>các</a:t>
-            </a:r>
-            <a:r>
-              <a:rPr lang="en-US" sz="2800" dirty="0" smtClean="0"/>
-              <a:t> </a:t>
-            </a:r>
-            <a:r>
-              <a:rPr lang="en-US" sz="2800" dirty="0" err="1" smtClean="0"/>
-              <a:t>văn</a:t>
-            </a:r>
-            <a:r>
-              <a:rPr lang="en-US" sz="2800" dirty="0" smtClean="0"/>
-              <a:t> </a:t>
-            </a:r>
-            <a:r>
-              <a:rPr lang="en-US" sz="2800" dirty="0" err="1" smtClean="0"/>
-              <a:t>bản</a:t>
-            </a:r>
-            <a:r>
-              <a:rPr lang="en-US" sz="2800" dirty="0" smtClean="0"/>
-              <a:t> </a:t>
-            </a:r>
-            <a:r>
-              <a:rPr lang="en-US" sz="2800" dirty="0" err="1" smtClean="0"/>
-              <a:t>của</a:t>
-            </a:r>
-            <a:r>
-              <a:rPr lang="en-US" sz="2800" dirty="0" smtClean="0"/>
-              <a:t> </a:t>
-            </a:r>
-            <a:r>
-              <a:rPr lang="en-US" sz="2800" dirty="0" err="1" smtClean="0"/>
-              <a:t>lớp</a:t>
-            </a:r>
-            <a:r>
-              <a:rPr lang="en-US" sz="2800" dirty="0" smtClean="0"/>
-              <a:t> c.</a:t>
-            </a:r>
-          </a:p>
-          <a:p>
-            <a:pPr algn="just" eaLnBrk="1" hangingPunct="1">
-              <a:defRPr/>
-            </a:pPr>
-            <a:r>
-              <a:rPr lang="en-US" sz="2800" dirty="0" err="1" smtClean="0"/>
-              <a:t>Vì</a:t>
-            </a:r>
-            <a:r>
-              <a:rPr lang="en-US" sz="2800" dirty="0" smtClean="0"/>
-              <a:t> </a:t>
-            </a:r>
-            <a:r>
-              <a:rPr lang="en-US" sz="2800" i="1" dirty="0" smtClean="0"/>
-              <a:t>t</a:t>
-            </a:r>
-            <a:r>
-              <a:rPr lang="en-US" sz="2800" dirty="0" smtClean="0"/>
-              <a:t> </a:t>
-            </a:r>
-            <a:r>
-              <a:rPr lang="en-US" sz="2800" dirty="0" err="1" smtClean="0"/>
-              <a:t>là</a:t>
-            </a:r>
-            <a:r>
-              <a:rPr lang="en-US" sz="2800" dirty="0" smtClean="0"/>
-              <a:t> </a:t>
-            </a:r>
-            <a:r>
-              <a:rPr lang="en-US" sz="2800" dirty="0" err="1" smtClean="0"/>
-              <a:t>từ</a:t>
-            </a:r>
-            <a:r>
-              <a:rPr lang="en-US" sz="2800" dirty="0" smtClean="0"/>
-              <a:t> </a:t>
-            </a:r>
-            <a:r>
-              <a:rPr lang="en-US" sz="2800" dirty="0" err="1" smtClean="0"/>
-              <a:t>hiếm</a:t>
-            </a:r>
-            <a:r>
-              <a:rPr lang="en-US" sz="2800" dirty="0" smtClean="0"/>
-              <a:t> </a:t>
-            </a:r>
-            <a:r>
-              <a:rPr lang="en-US" sz="2800" dirty="0" err="1" smtClean="0"/>
-              <a:t>nên</a:t>
-            </a:r>
-            <a:r>
-              <a:rPr lang="en-US" sz="2800" dirty="0" smtClean="0"/>
-              <a:t> </a:t>
-            </a:r>
-            <a:r>
-              <a:rPr lang="en-US" sz="2800" dirty="0" err="1" smtClean="0"/>
-              <a:t>bộ</a:t>
-            </a:r>
-            <a:r>
-              <a:rPr lang="en-US" sz="2800" dirty="0" smtClean="0"/>
-              <a:t> </a:t>
-            </a:r>
-            <a:r>
-              <a:rPr lang="en-US" sz="2800" dirty="0" err="1" smtClean="0"/>
-              <a:t>phân</a:t>
-            </a:r>
-            <a:r>
-              <a:rPr lang="en-US" sz="2800" dirty="0" smtClean="0"/>
-              <a:t> </a:t>
-            </a:r>
-            <a:r>
-              <a:rPr lang="en-US" sz="2800" dirty="0" err="1" smtClean="0"/>
-              <a:t>lớp</a:t>
-            </a:r>
-            <a:r>
-              <a:rPr lang="en-US" sz="2800" dirty="0" smtClean="0"/>
-              <a:t> </a:t>
-            </a:r>
-            <a:r>
-              <a:rPr lang="en-US" sz="2800" dirty="0" err="1" smtClean="0"/>
-              <a:t>sau</a:t>
-            </a:r>
-            <a:r>
-              <a:rPr lang="en-US" sz="2800" dirty="0" smtClean="0"/>
-              <a:t> </a:t>
-            </a:r>
-            <a:r>
-              <a:rPr lang="en-US" sz="2800" dirty="0" err="1" smtClean="0"/>
-              <a:t>huấn</a:t>
-            </a:r>
-            <a:r>
-              <a:rPr lang="en-US" sz="2800" dirty="0" smtClean="0"/>
-              <a:t> </a:t>
-            </a:r>
-            <a:r>
-              <a:rPr lang="en-US" sz="2800" dirty="0" err="1" smtClean="0"/>
-              <a:t>luyện</a:t>
-            </a:r>
-            <a:r>
-              <a:rPr lang="en-US" sz="2800" dirty="0" smtClean="0"/>
-              <a:t> </a:t>
-            </a:r>
-            <a:r>
-              <a:rPr lang="en-US" sz="2800" dirty="0" err="1" smtClean="0"/>
-              <a:t>có</a:t>
-            </a:r>
-            <a:r>
-              <a:rPr lang="en-US" sz="2800" dirty="0" smtClean="0"/>
-              <a:t> </a:t>
-            </a:r>
-            <a:r>
-              <a:rPr lang="en-US" sz="2800" dirty="0" err="1" smtClean="0"/>
-              <a:t>thể</a:t>
-            </a:r>
-            <a:r>
-              <a:rPr lang="en-US" sz="2800" dirty="0" smtClean="0"/>
-              <a:t> </a:t>
-            </a:r>
-            <a:r>
-              <a:rPr lang="en-US" sz="2800" dirty="0" err="1" smtClean="0"/>
-              <a:t>coi</a:t>
-            </a:r>
-            <a:r>
-              <a:rPr lang="en-US" sz="2800" dirty="0" smtClean="0"/>
-              <a:t> </a:t>
-            </a:r>
-            <a:r>
-              <a:rPr lang="en-US" sz="2800" i="1" dirty="0" smtClean="0"/>
-              <a:t>t</a:t>
-            </a:r>
-            <a:r>
-              <a:rPr lang="en-US" sz="2800" dirty="0" smtClean="0"/>
-              <a:t> </a:t>
-            </a:r>
-            <a:r>
-              <a:rPr lang="en-US" sz="2800" dirty="0" err="1" smtClean="0"/>
-              <a:t>như</a:t>
-            </a:r>
-            <a:r>
-              <a:rPr lang="en-US" sz="2800" dirty="0" smtClean="0"/>
-              <a:t> </a:t>
-            </a:r>
-            <a:r>
-              <a:rPr lang="en-US" sz="2800" dirty="0" err="1" smtClean="0"/>
-              <a:t>một</a:t>
-            </a:r>
-            <a:r>
-              <a:rPr lang="en-US" sz="2800" dirty="0" smtClean="0"/>
-              <a:t> </a:t>
-            </a:r>
-            <a:r>
-              <a:rPr lang="en-US" sz="2800" dirty="0" err="1" smtClean="0"/>
-              <a:t>tín</a:t>
-            </a:r>
-            <a:r>
-              <a:rPr lang="en-US" sz="2800" dirty="0" smtClean="0"/>
-              <a:t> </a:t>
-            </a:r>
-            <a:r>
-              <a:rPr lang="en-US" sz="2800" dirty="0" err="1" smtClean="0"/>
-              <a:t>hiệu</a:t>
-            </a:r>
-            <a:r>
-              <a:rPr lang="en-US" sz="2800" dirty="0" smtClean="0"/>
-              <a:t> </a:t>
-            </a:r>
-            <a:r>
-              <a:rPr lang="en-US" sz="2800" err="1" smtClean="0"/>
-              <a:t>mạnh</a:t>
-            </a:r>
-            <a:r>
-              <a:rPr lang="en-US" sz="2800" smtClean="0"/>
-              <a:t> để xếp các văn bản chứa t vào lớp </a:t>
-            </a:r>
-            <a:r>
-              <a:rPr lang="en-US" sz="2800" dirty="0" smtClean="0"/>
-              <a:t>c.</a:t>
-            </a:r>
-          </a:p>
-          <a:p>
-            <a:pPr lvl="1" algn="just" eaLnBrk="1" hangingPunct="1">
-              <a:defRPr/>
-            </a:pPr>
-            <a:r>
-              <a:rPr lang="en-US" sz="2400" dirty="0" err="1" smtClean="0"/>
-              <a:t>Hiện</a:t>
-            </a:r>
-            <a:r>
-              <a:rPr lang="en-US" sz="2400" dirty="0" smtClean="0"/>
-              <a:t> </a:t>
-            </a:r>
-            <a:r>
-              <a:rPr lang="en-US" sz="2400" dirty="0" err="1" smtClean="0"/>
-              <a:t>tượng</a:t>
-            </a:r>
-            <a:r>
-              <a:rPr lang="en-US" sz="2400" dirty="0" smtClean="0"/>
-              <a:t> </a:t>
-            </a:r>
-            <a:r>
-              <a:rPr lang="en-US" sz="2400" dirty="0" err="1" smtClean="0"/>
-              <a:t>này</a:t>
-            </a:r>
-            <a:r>
-              <a:rPr lang="en-US" sz="2400" dirty="0" smtClean="0"/>
-              <a:t> </a:t>
-            </a:r>
-            <a:r>
-              <a:rPr lang="en-US" sz="2400" dirty="0" err="1" smtClean="0"/>
-              <a:t>được</a:t>
-            </a:r>
-            <a:r>
-              <a:rPr lang="en-US" sz="2400" dirty="0" smtClean="0"/>
-              <a:t> </a:t>
-            </a:r>
-            <a:r>
-              <a:rPr lang="en-US" sz="2400" dirty="0" err="1" smtClean="0"/>
-              <a:t>gọi</a:t>
-            </a:r>
-            <a:r>
-              <a:rPr lang="en-US" sz="2400" dirty="0" smtClean="0"/>
-              <a:t> </a:t>
-            </a:r>
-            <a:r>
-              <a:rPr lang="en-US" sz="2400" err="1" smtClean="0"/>
-              <a:t>là</a:t>
-            </a:r>
-            <a:r>
-              <a:rPr lang="en-US" sz="2400" smtClean="0"/>
-              <a:t> </a:t>
-            </a:r>
-            <a:r>
-              <a:rPr lang="en-US" sz="2400" i="1" smtClean="0"/>
-              <a:t>overfitting</a:t>
-            </a:r>
-            <a:endParaRPr lang="en-US" sz="2400" i="1" dirty="0" smtClean="0"/>
+              <a:t>.</a:t>
+            </a:r>
           </a:p>
         </p:txBody>
       </p:sp>
@@ -13577,7 +13446,7 @@
     </p:spTree>
     <p:extLst>
       <p:ext uri="{BB962C8B-B14F-4D97-AF65-F5344CB8AC3E}">
-        <p14:creationId xmlns:p14="http://schemas.microsoft.com/office/powerpoint/2010/main" val="1362896372"/>
+        <p14:creationId xmlns:p14="http://schemas.microsoft.com/office/powerpoint/2010/main" val="2313394124"/>
       </p:ext>
     </p:extLst>
   </p:cSld>
@@ -13629,7 +13498,7 @@
             <a:pPr eaLnBrk="1" hangingPunct="1"/>
             <a:r>
               <a:rPr lang="en-US" sz="3600" dirty="0" err="1" smtClean="0"/>
-              <a:t>Trích</a:t>
+              <a:t>Đặc</a:t>
             </a:r>
             <a:r>
               <a:rPr lang="en-US" sz="3600" dirty="0" smtClean="0"/>
@@ -13637,7 +13506,7 @@
             </a:r>
             <a:r>
               <a:rPr lang="en-US" sz="3600" dirty="0" err="1" smtClean="0"/>
-              <a:t>chọn</a:t>
+              <a:t>trưng</a:t>
             </a:r>
             <a:r>
               <a:rPr lang="en-US" sz="3600" dirty="0" smtClean="0"/>
@@ -13645,15 +13514,7 @@
             </a:r>
             <a:r>
               <a:rPr lang="en-US" sz="3600" dirty="0" err="1" smtClean="0"/>
-              <a:t>đặc</a:t>
-            </a:r>
-            <a:r>
-              <a:rPr lang="en-US" sz="3600" dirty="0" smtClean="0"/>
-              <a:t> </a:t>
-            </a:r>
-            <a:r>
-              <a:rPr lang="en-US" sz="3600" dirty="0" err="1" smtClean="0"/>
-              <a:t>trưng</a:t>
+              <a:t>nhiễu</a:t>
             </a:r>
             <a:endParaRPr lang="vi-VN" sz="3600" dirty="0" smtClean="0"/>
           </a:p>
@@ -13683,8 +13544,366 @@
               <a:defRPr/>
             </a:pPr>
             <a:r>
+              <a:rPr lang="en-US" sz="2800"/>
+              <a:t>Đặc trưng nhiễu là những </a:t>
+            </a:r>
+            <a:r>
               <a:rPr lang="en-US" sz="2800" smtClean="0"/>
-              <a:t>Quá trình loại bỏ các đặc trưng nhiễu gọi là trích chọn đặc trưng:</a:t>
+              <a:t>đặc trưng mà </a:t>
+            </a:r>
+            <a:r>
+              <a:rPr lang="en-US" sz="2800"/>
+              <a:t>khi thêm vào văn bản sẽ làm tăng lỗi phân lớp</a:t>
+            </a:r>
+            <a:r>
+              <a:rPr lang="en-US" sz="2800" smtClean="0"/>
+              <a:t>;</a:t>
+            </a:r>
+          </a:p>
+          <a:p>
+            <a:pPr algn="just" eaLnBrk="1" hangingPunct="1">
+              <a:defRPr/>
+            </a:pPr>
+            <a:r>
+              <a:rPr lang="en-US" sz="2800" smtClean="0"/>
+              <a:t>Giả </a:t>
+            </a:r>
+            <a:r>
+              <a:rPr lang="en-US" sz="2800" dirty="0" err="1" smtClean="0"/>
+              <a:t>sử</a:t>
+            </a:r>
+            <a:r>
+              <a:rPr lang="en-US" sz="2800" dirty="0" smtClean="0"/>
+              <a:t> </a:t>
+            </a:r>
+            <a:r>
+              <a:rPr lang="en-US" sz="2800" dirty="0" err="1" smtClean="0"/>
+              <a:t>một</a:t>
+            </a:r>
+            <a:r>
+              <a:rPr lang="en-US" sz="2800" dirty="0" smtClean="0"/>
+              <a:t> </a:t>
+            </a:r>
+            <a:r>
+              <a:rPr lang="en-US" sz="2800" dirty="0" err="1" smtClean="0"/>
+              <a:t>từ</a:t>
+            </a:r>
+            <a:r>
+              <a:rPr lang="en-US" sz="2800" dirty="0" smtClean="0"/>
+              <a:t> </a:t>
+            </a:r>
+            <a:r>
+              <a:rPr lang="en-US" sz="2800" dirty="0" err="1" smtClean="0"/>
+              <a:t>hiếm</a:t>
+            </a:r>
+            <a:r>
+              <a:rPr lang="en-US" sz="2800" dirty="0" smtClean="0"/>
+              <a:t> t </a:t>
+            </a:r>
+            <a:r>
+              <a:rPr lang="en-US" sz="2800" dirty="0" err="1" smtClean="0"/>
+              <a:t>không</a:t>
+            </a:r>
+            <a:r>
+              <a:rPr lang="en-US" sz="2800" dirty="0" smtClean="0"/>
+              <a:t> </a:t>
+            </a:r>
+            <a:r>
+              <a:rPr lang="en-US" sz="2800" dirty="0" err="1" smtClean="0"/>
+              <a:t>chứa</a:t>
+            </a:r>
+            <a:r>
+              <a:rPr lang="en-US" sz="2800" dirty="0" smtClean="0"/>
+              <a:t> </a:t>
+            </a:r>
+            <a:r>
+              <a:rPr lang="en-US" sz="2800" dirty="0" err="1" smtClean="0"/>
+              <a:t>thông</a:t>
+            </a:r>
+            <a:r>
+              <a:rPr lang="en-US" sz="2800" dirty="0" smtClean="0"/>
+              <a:t> tin </a:t>
+            </a:r>
+            <a:r>
+              <a:rPr lang="en-US" sz="2800" dirty="0" err="1" smtClean="0"/>
+              <a:t>liên</a:t>
+            </a:r>
+            <a:r>
+              <a:rPr lang="en-US" sz="2800" dirty="0" smtClean="0"/>
+              <a:t> </a:t>
+            </a:r>
+            <a:r>
+              <a:rPr lang="en-US" sz="2800" dirty="0" err="1" smtClean="0"/>
+              <a:t>quan</a:t>
+            </a:r>
+            <a:r>
+              <a:rPr lang="en-US" sz="2800" dirty="0" smtClean="0"/>
+              <a:t> </a:t>
+            </a:r>
+            <a:r>
+              <a:rPr lang="en-US" sz="2800" dirty="0" err="1" smtClean="0"/>
+              <a:t>đến</a:t>
+            </a:r>
+            <a:r>
+              <a:rPr lang="en-US" sz="2800" dirty="0" smtClean="0"/>
+              <a:t> </a:t>
+            </a:r>
+            <a:r>
+              <a:rPr lang="en-US" sz="2800" dirty="0" err="1" smtClean="0"/>
+              <a:t>lớp</a:t>
+            </a:r>
+            <a:r>
+              <a:rPr lang="en-US" sz="2800" dirty="0" smtClean="0"/>
+              <a:t> c </a:t>
+            </a:r>
+            <a:r>
+              <a:rPr lang="en-US" sz="2800" err="1" smtClean="0"/>
+              <a:t>nhưng</a:t>
+            </a:r>
+            <a:r>
+              <a:rPr lang="en-US" sz="2800" smtClean="0"/>
+              <a:t> lại </a:t>
+            </a:r>
+            <a:r>
+              <a:rPr lang="en-US" sz="2800" dirty="0" err="1" smtClean="0"/>
+              <a:t>xuất</a:t>
+            </a:r>
+            <a:r>
+              <a:rPr lang="en-US" sz="2800" dirty="0" smtClean="0"/>
+              <a:t> </a:t>
+            </a:r>
+            <a:r>
+              <a:rPr lang="en-US" sz="2800" dirty="0" err="1" smtClean="0"/>
+              <a:t>hiện</a:t>
+            </a:r>
+            <a:r>
+              <a:rPr lang="en-US" sz="2800" dirty="0" smtClean="0"/>
+              <a:t> </a:t>
+            </a:r>
+            <a:r>
+              <a:rPr lang="en-US" sz="2800" dirty="0" err="1" smtClean="0"/>
+              <a:t>trong</a:t>
+            </a:r>
+            <a:r>
+              <a:rPr lang="en-US" sz="2800" dirty="0" smtClean="0"/>
+              <a:t> </a:t>
+            </a:r>
+            <a:r>
+              <a:rPr lang="en-US" sz="2800" dirty="0" err="1" smtClean="0"/>
+              <a:t>các</a:t>
+            </a:r>
+            <a:r>
+              <a:rPr lang="en-US" sz="2800" dirty="0" smtClean="0"/>
+              <a:t> </a:t>
+            </a:r>
+            <a:r>
+              <a:rPr lang="en-US" sz="2800" dirty="0" err="1" smtClean="0"/>
+              <a:t>văn</a:t>
+            </a:r>
+            <a:r>
+              <a:rPr lang="en-US" sz="2800" dirty="0" smtClean="0"/>
+              <a:t> </a:t>
+            </a:r>
+            <a:r>
+              <a:rPr lang="en-US" sz="2800" dirty="0" err="1" smtClean="0"/>
+              <a:t>bản</a:t>
+            </a:r>
+            <a:r>
+              <a:rPr lang="en-US" sz="2800" dirty="0" smtClean="0"/>
+              <a:t> </a:t>
+            </a:r>
+            <a:r>
+              <a:rPr lang="en-US" sz="2800" dirty="0" err="1" smtClean="0"/>
+              <a:t>của</a:t>
+            </a:r>
+            <a:r>
+              <a:rPr lang="en-US" sz="2800" dirty="0" smtClean="0"/>
+              <a:t> </a:t>
+            </a:r>
+            <a:r>
+              <a:rPr lang="en-US" sz="2800" dirty="0" err="1" smtClean="0"/>
+              <a:t>lớp</a:t>
+            </a:r>
+            <a:r>
+              <a:rPr lang="en-US" sz="2800" dirty="0" smtClean="0"/>
+              <a:t> c.</a:t>
+            </a:r>
+          </a:p>
+          <a:p>
+            <a:pPr algn="just" eaLnBrk="1" hangingPunct="1">
+              <a:defRPr/>
+            </a:pPr>
+            <a:r>
+              <a:rPr lang="en-US" sz="2800" dirty="0" err="1" smtClean="0"/>
+              <a:t>Vì</a:t>
+            </a:r>
+            <a:r>
+              <a:rPr lang="en-US" sz="2800" dirty="0" smtClean="0"/>
+              <a:t> </a:t>
+            </a:r>
+            <a:r>
+              <a:rPr lang="en-US" sz="2800" i="1" dirty="0" smtClean="0"/>
+              <a:t>t</a:t>
+            </a:r>
+            <a:r>
+              <a:rPr lang="en-US" sz="2800" dirty="0" smtClean="0"/>
+              <a:t> </a:t>
+            </a:r>
+            <a:r>
+              <a:rPr lang="en-US" sz="2800" dirty="0" err="1" smtClean="0"/>
+              <a:t>là</a:t>
+            </a:r>
+            <a:r>
+              <a:rPr lang="en-US" sz="2800" dirty="0" smtClean="0"/>
+              <a:t> </a:t>
+            </a:r>
+            <a:r>
+              <a:rPr lang="en-US" sz="2800" dirty="0" err="1" smtClean="0"/>
+              <a:t>từ</a:t>
+            </a:r>
+            <a:r>
+              <a:rPr lang="en-US" sz="2800" dirty="0" smtClean="0"/>
+              <a:t> </a:t>
+            </a:r>
+            <a:r>
+              <a:rPr lang="en-US" sz="2800" dirty="0" err="1" smtClean="0"/>
+              <a:t>hiếm</a:t>
+            </a:r>
+            <a:r>
+              <a:rPr lang="en-US" sz="2800" dirty="0" smtClean="0"/>
+              <a:t> </a:t>
+            </a:r>
+            <a:r>
+              <a:rPr lang="en-US" sz="2800" dirty="0" err="1" smtClean="0"/>
+              <a:t>nên</a:t>
+            </a:r>
+            <a:r>
+              <a:rPr lang="en-US" sz="2800" dirty="0" smtClean="0"/>
+              <a:t> </a:t>
+            </a:r>
+            <a:r>
+              <a:rPr lang="en-US" sz="2800" dirty="0" err="1" smtClean="0"/>
+              <a:t>bộ</a:t>
+            </a:r>
+            <a:r>
+              <a:rPr lang="en-US" sz="2800" dirty="0" smtClean="0"/>
+              <a:t> </a:t>
+            </a:r>
+            <a:r>
+              <a:rPr lang="en-US" sz="2800" dirty="0" err="1" smtClean="0"/>
+              <a:t>phân</a:t>
+            </a:r>
+            <a:r>
+              <a:rPr lang="en-US" sz="2800" dirty="0" smtClean="0"/>
+              <a:t> </a:t>
+            </a:r>
+            <a:r>
+              <a:rPr lang="en-US" sz="2800" dirty="0" err="1" smtClean="0"/>
+              <a:t>lớp</a:t>
+            </a:r>
+            <a:r>
+              <a:rPr lang="en-US" sz="2800" dirty="0" smtClean="0"/>
+              <a:t> </a:t>
+            </a:r>
+            <a:r>
+              <a:rPr lang="en-US" sz="2800" dirty="0" err="1" smtClean="0"/>
+              <a:t>sau</a:t>
+            </a:r>
+            <a:r>
+              <a:rPr lang="en-US" sz="2800" dirty="0" smtClean="0"/>
+              <a:t> </a:t>
+            </a:r>
+            <a:r>
+              <a:rPr lang="en-US" sz="2800" dirty="0" err="1" smtClean="0"/>
+              <a:t>huấn</a:t>
+            </a:r>
+            <a:r>
+              <a:rPr lang="en-US" sz="2800" dirty="0" smtClean="0"/>
+              <a:t> </a:t>
+            </a:r>
+            <a:r>
+              <a:rPr lang="en-US" sz="2800" dirty="0" err="1" smtClean="0"/>
+              <a:t>luyện</a:t>
+            </a:r>
+            <a:r>
+              <a:rPr lang="en-US" sz="2800" dirty="0" smtClean="0"/>
+              <a:t> </a:t>
+            </a:r>
+            <a:r>
+              <a:rPr lang="en-US" sz="2800" dirty="0" err="1" smtClean="0"/>
+              <a:t>có</a:t>
+            </a:r>
+            <a:r>
+              <a:rPr lang="en-US" sz="2800" dirty="0" smtClean="0"/>
+              <a:t> </a:t>
+            </a:r>
+            <a:r>
+              <a:rPr lang="en-US" sz="2800" dirty="0" err="1" smtClean="0"/>
+              <a:t>thể</a:t>
+            </a:r>
+            <a:r>
+              <a:rPr lang="en-US" sz="2800" dirty="0" smtClean="0"/>
+              <a:t> </a:t>
+            </a:r>
+            <a:r>
+              <a:rPr lang="en-US" sz="2800" dirty="0" err="1" smtClean="0"/>
+              <a:t>coi</a:t>
+            </a:r>
+            <a:r>
+              <a:rPr lang="en-US" sz="2800" dirty="0" smtClean="0"/>
+              <a:t> </a:t>
+            </a:r>
+            <a:r>
+              <a:rPr lang="en-US" sz="2800" i="1" dirty="0" smtClean="0"/>
+              <a:t>t</a:t>
+            </a:r>
+            <a:r>
+              <a:rPr lang="en-US" sz="2800" dirty="0" smtClean="0"/>
+              <a:t> </a:t>
+            </a:r>
+            <a:r>
+              <a:rPr lang="en-US" sz="2800" dirty="0" err="1" smtClean="0"/>
+              <a:t>như</a:t>
+            </a:r>
+            <a:r>
+              <a:rPr lang="en-US" sz="2800" dirty="0" smtClean="0"/>
+              <a:t> </a:t>
+            </a:r>
+            <a:r>
+              <a:rPr lang="en-US" sz="2800" dirty="0" err="1" smtClean="0"/>
+              <a:t>một</a:t>
+            </a:r>
+            <a:r>
+              <a:rPr lang="en-US" sz="2800" dirty="0" smtClean="0"/>
+              <a:t> </a:t>
+            </a:r>
+            <a:r>
+              <a:rPr lang="en-US" sz="2800" dirty="0" err="1" smtClean="0"/>
+              <a:t>tín</a:t>
+            </a:r>
+            <a:r>
+              <a:rPr lang="en-US" sz="2800" dirty="0" smtClean="0"/>
+              <a:t> </a:t>
+            </a:r>
+            <a:r>
+              <a:rPr lang="en-US" sz="2800" dirty="0" err="1" smtClean="0"/>
+              <a:t>hiệu</a:t>
+            </a:r>
+            <a:r>
+              <a:rPr lang="en-US" sz="2800" dirty="0" smtClean="0"/>
+              <a:t> </a:t>
+            </a:r>
+            <a:r>
+              <a:rPr lang="en-US" sz="2800" err="1" smtClean="0"/>
+              <a:t>mạnh</a:t>
+            </a:r>
+            <a:r>
+              <a:rPr lang="en-US" sz="2800" smtClean="0"/>
+              <a:t> để xếp các văn bản chứa t vào lớp </a:t>
+            </a:r>
+            <a:r>
+              <a:rPr lang="en-US" sz="2800" dirty="0" smtClean="0"/>
+              <a:t>c.</a:t>
             </a:r>
           </a:p>
           <a:p>
@@ -13692,18 +13911,58 @@
               <a:defRPr/>
             </a:pPr>
             <a:r>
+              <a:rPr lang="en-US" sz="2400" dirty="0" err="1" smtClean="0"/>
+              <a:t>Hiện</a:t>
+            </a:r>
+            <a:r>
+              <a:rPr lang="en-US" sz="2400" dirty="0" smtClean="0"/>
+              <a:t> </a:t>
+            </a:r>
+            <a:r>
+              <a:rPr lang="en-US" sz="2400" dirty="0" err="1" smtClean="0"/>
+              <a:t>tượng</a:t>
+            </a:r>
+            <a:r>
+              <a:rPr lang="en-US" sz="2400" dirty="0" smtClean="0"/>
+              <a:t> </a:t>
+            </a:r>
+            <a:r>
+              <a:rPr lang="en-US" sz="2400" dirty="0" err="1" smtClean="0"/>
+              <a:t>này</a:t>
+            </a:r>
+            <a:r>
+              <a:rPr lang="en-US" sz="2400" dirty="0" smtClean="0"/>
+              <a:t> </a:t>
+            </a:r>
+            <a:r>
+              <a:rPr lang="en-US" sz="2400" dirty="0" err="1" smtClean="0"/>
+              <a:t>được</a:t>
+            </a:r>
+            <a:r>
+              <a:rPr lang="en-US" sz="2400" dirty="0" smtClean="0"/>
+              <a:t> </a:t>
+            </a:r>
+            <a:r>
+              <a:rPr lang="en-US" sz="2400" dirty="0" err="1" smtClean="0"/>
+              <a:t>gọi</a:t>
+            </a:r>
+            <a:r>
+              <a:rPr lang="en-US" sz="2400" dirty="0" smtClean="0"/>
+              <a:t> </a:t>
+            </a:r>
+            <a:r>
+              <a:rPr lang="en-US" sz="2400" err="1" smtClean="0"/>
+              <a:t>là</a:t>
+            </a:r>
+            <a:r>
               <a:rPr lang="en-US" sz="2400" smtClean="0"/>
-              <a:t>Giúp phân lớp chính xác hơn;</a:t>
-            </a:r>
-          </a:p>
-          <a:p>
-            <a:pPr lvl="1" algn="just" eaLnBrk="1" hangingPunct="1">
-              <a:defRPr/>
-            </a:pPr>
-            <a:r>
-              <a:rPr lang="en-US" sz="2400" smtClean="0"/>
-              <a:t>Tăng tốc độ (nhờ giảm khối lượng dữ liệu cần xử lý).</a:t>
-            </a:r>
+              <a:t> </a:t>
+            </a:r>
+            <a:r>
+              <a:rPr lang="en-US" sz="2400" i="1" smtClean="0"/>
+              <a:t>overfitting</a:t>
+            </a:r>
+            <a:endParaRPr lang="en-US" sz="2400" i="1" dirty="0" smtClean="0"/>
           </a:p>
         </p:txBody>
       </p:sp>
@@ -13739,7 +13998,7 @@
     </p:spTree>
     <p:extLst>
       <p:ext uri="{BB962C8B-B14F-4D97-AF65-F5344CB8AC3E}">
-        <p14:creationId xmlns:p14="http://schemas.microsoft.com/office/powerpoint/2010/main" val="3390889490"/>
+        <p14:creationId xmlns:p14="http://schemas.microsoft.com/office/powerpoint/2010/main" val="1362896372"/>
       </p:ext>
     </p:extLst>
   </p:cSld>
@@ -14347,7 +14606,7 @@
   </a:extraClrSchemeLst>
   <a:extLst>
     <a:ext uri="{05A4C25C-085E-4340-85A3-A5531E510DB2}">
-      <thm15:themeFamily xmlns:thm15="http://schemas.microsoft.com/office/thememl/2012/main" xmlns="" name="Office Theme" id="{62F939B6-93AF-4DB8-9C6B-D6C7DFDC589F}" vid="{4A3C46E8-61CC-4603-A589-7422A47A8E4A}"/>
+      <thm15:themeFamily xmlns="" xmlns:thm15="http://schemas.microsoft.com/office/thememl/2012/main" name="Office Theme" id="{62F939B6-93AF-4DB8-9C6B-D6C7DFDC589F}" vid="{4A3C46E8-61CC-4603-A589-7422A47A8E4A}"/>
     </a:ext>
   </a:extLst>
 </a:theme>
@@ -14608,7 +14867,7 @@
   <a:extraClrSchemeLst/>
   <a:extLst>
     <a:ext uri="{05A4C25C-085E-4340-85A3-A5531E510DB2}">
-      <thm15:themeFamily xmlns:thm15="http://schemas.microsoft.com/office/thememl/2012/main" xmlns="" name="Office Theme" id="{62F939B6-93AF-4DB8-9C6B-D6C7DFDC589F}" vid="{4A3C46E8-61CC-4603-A589-7422A47A8E4A}"/>
+      <thm15:themeFamily xmlns="" xmlns:thm15="http://schemas.microsoft.com/office/thememl/2012/main" name="Office Theme" id="{62F939B6-93AF-4DB8-9C6B-D6C7DFDC589F}" vid="{4A3C46E8-61CC-4603-A589-7422A47A8E4A}"/>
     </a:ext>
   </a:extLst>
 </a:theme>

</xml_diff>